<commit_message>
Powerpoint præsentation med Mias noter
</commit_message>
<xml_diff>
--- a/Afleveringer/Eksamen/Domain Name System.pptx
+++ b/Afleveringer/Eksamen/Domain Name System.pptx
@@ -210,7 +210,7 @@
             <a:fld id="{2F982AAE-B938-4249-BAB5-25214BF85327}" type="datetimeFigureOut">
               <a:rPr lang="da-DK" smtClean="0"/>
               <a:pPr/>
-              <a:t>24-05-2013</a:t>
+              <a:t>28-05-2013</a:t>
             </a:fld>
             <a:endParaRPr lang="da-DK"/>
           </a:p>
@@ -788,11 +788,7 @@
           <a:p>
             <a:r>
               <a:rPr lang="da-DK" dirty="0" smtClean="0"/>
-              <a:t>Vi </a:t>
-            </a:r>
-            <a:r>
-              <a:rPr lang="da-DK" dirty="0" smtClean="0"/>
-              <a:t>brugte disse to, men synes ikke der var markant forslag i tiden opslagene brugte.</a:t>
+              <a:t>Vi brugte disse to, men synes ikke der var markant forslag i tiden opslagene brugte.</a:t>
             </a:r>
           </a:p>
           <a:p>
@@ -926,6 +922,169 @@
 </p:notes>
 </file>
 
+<file path=ppt/notesSlides/notesSlide14.xml><?xml version="1.0" encoding="utf-8"?>
+<p:notes xmlns:a="http://schemas.openxmlformats.org/drawingml/2006/main" xmlns:r="http://schemas.openxmlformats.org/officeDocument/2006/relationships" xmlns:p="http://schemas.openxmlformats.org/presentationml/2006/main">
+  <p:cSld>
+    <p:spTree>
+      <p:nvGrpSpPr>
+        <p:cNvPr id="1" name=""/>
+        <p:cNvGrpSpPr/>
+        <p:nvPr/>
+      </p:nvGrpSpPr>
+      <p:grpSpPr>
+        <a:xfrm>
+          <a:off x="0" y="0"/>
+          <a:ext cx="0" cy="0"/>
+          <a:chOff x="0" y="0"/>
+          <a:chExt cx="0" cy="0"/>
+        </a:xfrm>
+      </p:grpSpPr>
+      <p:sp>
+        <p:nvSpPr>
+          <p:cNvPr id="2" name="Slide Image Placeholder 1"/>
+          <p:cNvSpPr>
+            <a:spLocks noGrp="1" noRot="1" noChangeAspect="1"/>
+          </p:cNvSpPr>
+          <p:nvPr>
+            <p:ph type="sldImg"/>
+          </p:nvPr>
+        </p:nvSpPr>
+        <p:spPr/>
+      </p:sp>
+      <p:sp>
+        <p:nvSpPr>
+          <p:cNvPr id="3" name="Notes Placeholder 2"/>
+          <p:cNvSpPr>
+            <a:spLocks noGrp="1"/>
+          </p:cNvSpPr>
+          <p:nvPr>
+            <p:ph type="body" idx="1"/>
+          </p:nvPr>
+        </p:nvSpPr>
+        <p:spPr/>
+        <p:txBody>
+          <a:bodyPr>
+            <a:normAutofit/>
+          </a:bodyPr>
+          <a:lstStyle/>
+          <a:p>
+            <a:r>
+              <a:rPr lang="da-DK" dirty="0" smtClean="0"/>
+              <a:t>Spørgsmål fra Christian:</a:t>
+            </a:r>
+          </a:p>
+          <a:p>
+            <a:pPr>
+              <a:buFontTx/>
+              <a:buChar char="-"/>
+            </a:pPr>
+            <a:r>
+              <a:rPr lang="da-DK" dirty="0" smtClean="0"/>
+              <a:t>Ved I om det er et ustabilt</a:t>
+            </a:r>
+            <a:r>
+              <a:rPr lang="da-DK" baseline="0" dirty="0" smtClean="0"/>
+              <a:t> system – det er jo ved at være ret gammelt.</a:t>
+            </a:r>
+          </a:p>
+          <a:p>
+            <a:pPr lvl="1">
+              <a:buFontTx/>
+              <a:buChar char="-"/>
+            </a:pPr>
+            <a:r>
+              <a:rPr lang="da-DK" baseline="0" dirty="0" smtClean="0"/>
+              <a:t>Det virker ret stabilt – der er 13 root servere som alle ved det samme. De er ”hemmelige”, så de burde ikke kunne gå ned alle sammen på samme tid. Det har været vist at det fungerer med 3 root servere.</a:t>
+            </a:r>
+          </a:p>
+          <a:p>
+            <a:pPr lvl="1">
+              <a:buFontTx/>
+              <a:buChar char="-"/>
+            </a:pPr>
+            <a:endParaRPr lang="da-DK" baseline="0" dirty="0" smtClean="0"/>
+          </a:p>
+          <a:p>
+            <a:pPr lvl="0">
+              <a:buFontTx/>
+              <a:buChar char="-"/>
+            </a:pPr>
+            <a:r>
+              <a:rPr lang="da-DK" baseline="0" dirty="0" smtClean="0"/>
+              <a:t>Ved I om det også bruges til mailservere?</a:t>
+            </a:r>
+          </a:p>
+          <a:p>
+            <a:pPr lvl="1">
+              <a:buFontTx/>
+              <a:buChar char="-"/>
+            </a:pPr>
+            <a:r>
+              <a:rPr lang="da-DK" baseline="0" dirty="0" smtClean="0"/>
+              <a:t>Ja, det gør det.</a:t>
+            </a:r>
+          </a:p>
+          <a:p>
+            <a:pPr lvl="1">
+              <a:buFontTx/>
+              <a:buChar char="-"/>
+            </a:pPr>
+            <a:endParaRPr lang="da-DK" baseline="0" dirty="0" smtClean="0"/>
+          </a:p>
+          <a:p>
+            <a:pPr lvl="0">
+              <a:buFontTx/>
+              <a:buChar char="-"/>
+            </a:pPr>
+            <a:r>
+              <a:rPr lang="da-DK" baseline="0" dirty="0" smtClean="0"/>
+              <a:t>Hvad bruger man så den Ipadresse man har fået til?</a:t>
+            </a:r>
+          </a:p>
+          <a:p>
+            <a:pPr lvl="1">
+              <a:buFontTx/>
+              <a:buChar char="-"/>
+            </a:pPr>
+            <a:r>
+              <a:rPr lang="da-DK" baseline="0" dirty="0" smtClean="0"/>
+              <a:t>Man får jo så en adresse til præcis den server man ønsker at tilgå. Og her spørger man så efter en applikation på en port.</a:t>
+            </a:r>
+          </a:p>
+        </p:txBody>
+      </p:sp>
+      <p:sp>
+        <p:nvSpPr>
+          <p:cNvPr id="4" name="Slide Number Placeholder 3"/>
+          <p:cNvSpPr>
+            <a:spLocks noGrp="1"/>
+          </p:cNvSpPr>
+          <p:nvPr>
+            <p:ph type="sldNum" sz="quarter" idx="10"/>
+          </p:nvPr>
+        </p:nvSpPr>
+        <p:spPr/>
+        <p:txBody>
+          <a:bodyPr/>
+          <a:lstStyle/>
+          <a:p>
+            <a:fld id="{4115820D-BE39-4EE3-A821-4F47A39DDAC9}" type="slidenum">
+              <a:rPr lang="da-DK" smtClean="0"/>
+              <a:pPr/>
+              <a:t>18</a:t>
+            </a:fld>
+            <a:endParaRPr lang="da-DK"/>
+          </a:p>
+        </p:txBody>
+      </p:sp>
+    </p:spTree>
+  </p:cSld>
+  <p:clrMapOvr>
+    <a:masterClrMapping/>
+  </p:clrMapOvr>
+</p:notes>
+</file>
+
 <file path=ppt/notesSlides/notesSlide2.xml><?xml version="1.0" encoding="utf-8"?>
 <p:notes xmlns:a="http://schemas.openxmlformats.org/drawingml/2006/main" xmlns:r="http://schemas.openxmlformats.org/officeDocument/2006/relationships" xmlns:p="http://schemas.openxmlformats.org/presentationml/2006/main">
   <p:cSld>
@@ -1152,15 +1311,47 @@
           <a:p>
             <a:r>
               <a:rPr lang="da-DK" dirty="0" smtClean="0"/>
-              <a:t>Forklar </a:t>
-            </a:r>
-            <a:r>
-              <a:rPr lang="da-DK" dirty="0" smtClean="0"/>
-              <a:t>om records : A-record (indeholder et logisk navn og en</a:t>
+              <a:t>Definitionen på et Domain Name System er; en service som mapper navne til</a:t>
             </a:r>
             <a:r>
               <a:rPr lang="da-DK" baseline="0" dirty="0" smtClean="0"/>
-              <a:t> IP adresse).</a:t>
+              <a:t> IP adresser.</a:t>
+            </a:r>
+          </a:p>
+          <a:p>
+            <a:r>
+              <a:rPr lang="da-DK" baseline="0" dirty="0" smtClean="0"/>
+              <a:t>Oprindeligt – da internettet var et meget lille netværk, fandtes disse oversigter over navne og IP adresser i en Host Lookup </a:t>
+            </a:r>
+            <a:r>
+              <a:rPr lang="da-DK" baseline="0" dirty="0" smtClean="0"/>
+              <a:t>Table </a:t>
+            </a:r>
+            <a:r>
+              <a:rPr lang="da-DK" baseline="0" dirty="0" smtClean="0"/>
+              <a:t>placeret på hver computer på netværket. På denne måde kunne computerne kommunikere vha. logiske navne. Når der tilkom en ny computer på netværket, skulle alle host lookup tables opdateres med det nye navn og den tilhørende IP adresse. Efterhånden som antallet af computere på netværket voksede blev denne procedure umulig. Derfor blev Domain Name System opfundet i 1982. DNS kan sammenlignes med en distribueret telefonbog, som sørger for at mappe logiske navne med IP adresser.</a:t>
+            </a:r>
+          </a:p>
+          <a:p>
+            <a:r>
+              <a:rPr lang="da-DK" dirty="0" smtClean="0"/>
+              <a:t>Den nuværende kommunikation over internettet foregår nu ved, at computeren tjekker sin lokale host lookup table, for at se om det logiske</a:t>
+            </a:r>
+            <a:r>
+              <a:rPr lang="da-DK" baseline="0" dirty="0" smtClean="0"/>
+              <a:t> navn er parret med en IP adresse. Hvis ikke benyttes DNS, som er en distribueret hierakisk database, som indeholder information associeret med domæne navne og IP adresser.</a:t>
+            </a:r>
+          </a:p>
+          <a:p>
+            <a:r>
+              <a:rPr lang="da-DK" baseline="0" dirty="0" smtClean="0"/>
+              <a:t>Øverst i hierakiet findes 13 root servers som er hemmeligt placeret i forskellige lande. Rasmus vil komme ind på den hierakiske opbygning senere.</a:t>
+            </a:r>
+          </a:p>
+          <a:p>
+            <a:r>
+              <a:rPr lang="da-DK" baseline="0" dirty="0" smtClean="0"/>
+              <a:t>Alt efter hvilken information der forespørges, findes den i forskellige typer af filer. Den type fil som returnere en IPv4 adresse kaldes en address record (A record). Af andre typer filer findes f.eks. CNAME som er et navn til navn opslag, hvor DNS-opslaget så forsøger at finde en IP-adresse tilhørende det nye navn. En anden type fil er MX-filer som indeholder mail servere.</a:t>
             </a:r>
             <a:endParaRPr lang="da-DK" dirty="0"/>
           </a:p>
@@ -1252,11 +1443,7 @@
           <a:p>
             <a:r>
               <a:rPr lang="da-DK" dirty="0" smtClean="0"/>
-              <a:t>Fully </a:t>
-            </a:r>
-            <a:r>
-              <a:rPr lang="da-DK" dirty="0" smtClean="0"/>
-              <a:t>Qualified Domain Name anvendes når enheder skal identificeres og tilgås. Den specificerer en eksakt</a:t>
+              <a:t>Fully Qualified Domain Name anvendes når enheder skal identificeres og tilgås. Den specificerer en eksakt</a:t>
             </a:r>
             <a:r>
               <a:rPr lang="da-DK" baseline="0" dirty="0" smtClean="0"/>
@@ -1350,11 +1537,7 @@
             </a:r>
             <a:r>
               <a:rPr lang="da-DK" baseline="0" dirty="0" smtClean="0"/>
-              <a:t> om hierarkiet og om </a:t>
-            </a:r>
-            <a:r>
-              <a:rPr lang="da-DK" baseline="0" dirty="0" smtClean="0"/>
-              <a:t>zoner</a:t>
+              <a:t> om hierarkiet og om zoner</a:t>
             </a:r>
           </a:p>
           <a:p>
@@ -1446,7 +1629,48 @@
           <a:p>
             <a:r>
               <a:rPr lang="da-DK" dirty="0" smtClean="0"/>
-              <a:t>Mia</a:t>
+              <a:t>Når</a:t>
+            </a:r>
+            <a:r>
+              <a:rPr lang="da-DK" baseline="0" dirty="0" smtClean="0"/>
+              <a:t> en computer skal finde en IP adresse kan det foregå på to måder:</a:t>
+            </a:r>
+          </a:p>
+          <a:p>
+            <a:pPr>
+              <a:buFont typeface="Arial" pitchFamily="34" charset="0"/>
+              <a:buChar char="•"/>
+            </a:pPr>
+            <a:r>
+              <a:rPr lang="da-DK" baseline="0" dirty="0" smtClean="0"/>
+              <a:t> Iterativ Name Resolution. Denne resolution inddrager clienten meget, da den starter med at spørger en root server efter hele navnet. Root server svarer tilbage med den del den kender; her ”nl”, som er Country code top level domain (ccTDL) name server. Så skal clienten henvende sig til den server der ved noget om resten af domæne-navnet. Og til sidst har den fået alle oplysningerne til at kontakte den pågældende node.</a:t>
+            </a:r>
+            <a:br>
+              <a:rPr lang="da-DK" baseline="0" dirty="0" smtClean="0"/>
+            </a:br>
+            <a:r>
+              <a:rPr lang="da-DK" baseline="0" dirty="0" smtClean="0"/>
+              <a:t>Denne metode bruges gerne øverst i hierakiet.</a:t>
+            </a:r>
+          </a:p>
+          <a:p>
+            <a:pPr lvl="1">
+              <a:buFont typeface="Arial" pitchFamily="34" charset="0"/>
+              <a:buChar char="•"/>
+            </a:pPr>
+            <a:r>
+              <a:rPr lang="da-DK" baseline="0" dirty="0" smtClean="0"/>
+              <a:t>For: root-serveren skal blot fortælle hvor TDL-serveren findes.</a:t>
+            </a:r>
+          </a:p>
+          <a:p>
+            <a:pPr>
+              <a:buFont typeface="Arial" pitchFamily="34" charset="0"/>
+              <a:buChar char="•"/>
+            </a:pPr>
+            <a:r>
+              <a:rPr lang="da-DK" baseline="0" dirty="0" smtClean="0"/>
+              <a:t> Recursiv Name Resolution – Se næste slide</a:t>
             </a:r>
             <a:endParaRPr lang="da-DK" dirty="0"/>
           </a:p>
@@ -1532,7 +1756,38 @@
           <a:p>
             <a:r>
               <a:rPr lang="da-DK" dirty="0" smtClean="0"/>
-              <a:t>Mia</a:t>
+              <a:t>I</a:t>
+            </a:r>
+            <a:r>
+              <a:rPr lang="da-DK" baseline="0" dirty="0" smtClean="0"/>
+              <a:t> den recursive metode ligger al arbejdet hos DNS serverne. Der spørges ned i hierakiet indtil IP adressen til det fulde domænenavn er fundet. Denne sendes så til clienten. DNS serverne har mulighed for at cache den fundne IP adresse, hvorved et nyt lookup undgås næste gang der spørges til det samme domæne.</a:t>
+            </a:r>
+            <a:br>
+              <a:rPr lang="da-DK" baseline="0" dirty="0" smtClean="0"/>
+            </a:br>
+            <a:r>
+              <a:rPr lang="da-DK" baseline="0" dirty="0" smtClean="0"/>
+              <a:t>Denne metode bruges gerne nederst i hierakiet, da denne metode ellers vil belaste root-server al for meget.</a:t>
+            </a:r>
+          </a:p>
+          <a:p>
+            <a:pPr lvl="1">
+              <a:buFont typeface="Arial" pitchFamily="34" charset="0"/>
+              <a:buChar char="•"/>
+            </a:pPr>
+            <a:r>
+              <a:rPr lang="da-DK" baseline="0" dirty="0" smtClean="0"/>
+              <a:t>For: Caching er mere effektivt; tidsbesparende og mindre ressourcekrævende</a:t>
+            </a:r>
+          </a:p>
+          <a:p>
+            <a:pPr lvl="1">
+              <a:buFont typeface="Arial" pitchFamily="34" charset="0"/>
+              <a:buChar char="•"/>
+            </a:pPr>
+            <a:r>
+              <a:rPr lang="da-DK" baseline="0" dirty="0" smtClean="0"/>
+              <a:t>Klienten er ikke så involveret</a:t>
             </a:r>
             <a:endParaRPr lang="da-DK" dirty="0"/>
           </a:p>
@@ -1963,7 +2218,7 @@
             <a:fld id="{F95D7CF2-08BE-4584-88A3-02DBA3238833}" type="datetimeFigureOut">
               <a:rPr lang="da-DK" smtClean="0"/>
               <a:pPr/>
-              <a:t>24-05-2013</a:t>
+              <a:t>28-05-2013</a:t>
             </a:fld>
             <a:endParaRPr lang="da-DK"/>
           </a:p>
@@ -2150,7 +2405,7 @@
             <a:fld id="{F95D7CF2-08BE-4584-88A3-02DBA3238833}" type="datetimeFigureOut">
               <a:rPr lang="da-DK" smtClean="0"/>
               <a:pPr/>
-              <a:t>24-05-2013</a:t>
+              <a:t>28-05-2013</a:t>
             </a:fld>
             <a:endParaRPr lang="da-DK"/>
           </a:p>
@@ -2337,7 +2592,7 @@
             <a:fld id="{F95D7CF2-08BE-4584-88A3-02DBA3238833}" type="datetimeFigureOut">
               <a:rPr lang="da-DK" smtClean="0"/>
               <a:pPr/>
-              <a:t>24-05-2013</a:t>
+              <a:t>28-05-2013</a:t>
             </a:fld>
             <a:endParaRPr lang="da-DK"/>
           </a:p>
@@ -2524,7 +2779,7 @@
             <a:fld id="{F95D7CF2-08BE-4584-88A3-02DBA3238833}" type="datetimeFigureOut">
               <a:rPr lang="da-DK" smtClean="0"/>
               <a:pPr/>
-              <a:t>24-05-2013</a:t>
+              <a:t>28-05-2013</a:t>
             </a:fld>
             <a:endParaRPr lang="da-DK"/>
           </a:p>
@@ -2907,7 +3162,7 @@
             <a:fld id="{F95D7CF2-08BE-4584-88A3-02DBA3238833}" type="datetimeFigureOut">
               <a:rPr lang="da-DK" smtClean="0"/>
               <a:pPr/>
-              <a:t>24-05-2013</a:t>
+              <a:t>28-05-2013</a:t>
             </a:fld>
             <a:endParaRPr lang="da-DK"/>
           </a:p>
@@ -3178,7 +3433,7 @@
             <a:fld id="{F95D7CF2-08BE-4584-88A3-02DBA3238833}" type="datetimeFigureOut">
               <a:rPr lang="da-DK" smtClean="0"/>
               <a:pPr/>
-              <a:t>24-05-2013</a:t>
+              <a:t>28-05-2013</a:t>
             </a:fld>
             <a:endParaRPr lang="da-DK"/>
           </a:p>
@@ -3565,7 +3820,7 @@
             <a:fld id="{F95D7CF2-08BE-4584-88A3-02DBA3238833}" type="datetimeFigureOut">
               <a:rPr lang="da-DK" smtClean="0"/>
               <a:pPr/>
-              <a:t>24-05-2013</a:t>
+              <a:t>28-05-2013</a:t>
             </a:fld>
             <a:endParaRPr lang="da-DK"/>
           </a:p>
@@ -3688,7 +3943,7 @@
             <a:fld id="{F95D7CF2-08BE-4584-88A3-02DBA3238833}" type="datetimeFigureOut">
               <a:rPr lang="da-DK" smtClean="0"/>
               <a:pPr/>
-              <a:t>24-05-2013</a:t>
+              <a:t>28-05-2013</a:t>
             </a:fld>
             <a:endParaRPr lang="da-DK"/>
           </a:p>
@@ -3870,7 +4125,7 @@
             <a:fld id="{F95D7CF2-08BE-4584-88A3-02DBA3238833}" type="datetimeFigureOut">
               <a:rPr lang="da-DK" smtClean="0"/>
               <a:pPr/>
-              <a:t>24-05-2013</a:t>
+              <a:t>28-05-2013</a:t>
             </a:fld>
             <a:endParaRPr lang="da-DK"/>
           </a:p>
@@ -4206,7 +4461,7 @@
             <a:fld id="{F95D7CF2-08BE-4584-88A3-02DBA3238833}" type="datetimeFigureOut">
               <a:rPr lang="da-DK" smtClean="0"/>
               <a:pPr/>
-              <a:t>24-05-2013</a:t>
+              <a:t>28-05-2013</a:t>
             </a:fld>
             <a:endParaRPr lang="da-DK"/>
           </a:p>
@@ -4577,7 +4832,7 @@
             <a:fld id="{F95D7CF2-08BE-4584-88A3-02DBA3238833}" type="datetimeFigureOut">
               <a:rPr lang="da-DK" smtClean="0"/>
               <a:pPr/>
-              <a:t>24-05-2013</a:t>
+              <a:t>28-05-2013</a:t>
             </a:fld>
             <a:endParaRPr lang="da-DK"/>
           </a:p>
@@ -4997,7 +5252,7 @@
             <a:fld id="{F95D7CF2-08BE-4584-88A3-02DBA3238833}" type="datetimeFigureOut">
               <a:rPr lang="da-DK" smtClean="0"/>
               <a:pPr/>
-              <a:t>24-05-2013</a:t>
+              <a:t>28-05-2013</a:t>
             </a:fld>
             <a:endParaRPr lang="da-DK"/>
           </a:p>
@@ -5503,6 +5758,13 @@
   <p:clrMapOvr>
     <a:masterClrMapping/>
   </p:clrMapOvr>
+  <p:timing>
+    <p:tnLst>
+      <p:par>
+        <p:cTn id="1" dur="indefinite" restart="never" nodeType="tmRoot"/>
+      </p:par>
+    </p:tnLst>
+  </p:timing>
 </p:sld>
 </file>
 
@@ -5631,6 +5893,13 @@
   <p:clrMapOvr>
     <a:masterClrMapping/>
   </p:clrMapOvr>
+  <p:timing>
+    <p:tnLst>
+      <p:par>
+        <p:cTn id="1" dur="indefinite" restart="never" nodeType="tmRoot"/>
+      </p:par>
+    </p:tnLst>
+  </p:timing>
 </p:sld>
 </file>
 
@@ -5751,6 +6020,13 @@
   <p:clrMapOvr>
     <a:masterClrMapping/>
   </p:clrMapOvr>
+  <p:timing>
+    <p:tnLst>
+      <p:par>
+        <p:cTn id="1" dur="indefinite" restart="never" nodeType="tmRoot"/>
+      </p:par>
+    </p:tnLst>
+  </p:timing>
 </p:sld>
 </file>
 
@@ -5935,6 +6211,13 @@
   <p:clrMapOvr>
     <a:masterClrMapping/>
   </p:clrMapOvr>
+  <p:timing>
+    <p:tnLst>
+      <p:par>
+        <p:cTn id="1" dur="indefinite" restart="never" nodeType="tmRoot"/>
+      </p:par>
+    </p:tnLst>
+  </p:timing>
 </p:sld>
 </file>
 
@@ -6155,6 +6438,13 @@
   <p:clrMapOvr>
     <a:masterClrMapping/>
   </p:clrMapOvr>
+  <p:timing>
+    <p:tnLst>
+      <p:par>
+        <p:cTn id="1" dur="indefinite" restart="never" nodeType="tmRoot"/>
+      </p:par>
+    </p:tnLst>
+  </p:timing>
 </p:sld>
 </file>
 
@@ -6236,8 +6526,21 @@
             </a:pPr>
             <a:r>
               <a:rPr lang="da-DK" dirty="0" smtClean="0"/>
-              <a:t>Implementering af en DNS server</a:t>
-            </a:r>
+              <a:t>Implementering </a:t>
+            </a:r>
+            <a:r>
+              <a:rPr lang="da-DK" dirty="0" smtClean="0"/>
+              <a:t>af </a:t>
+            </a:r>
+            <a:r>
+              <a:rPr lang="da-DK" dirty="0" smtClean="0"/>
+              <a:t>DNS </a:t>
+            </a:r>
+            <a:r>
+              <a:rPr lang="da-DK" dirty="0" smtClean="0"/>
+              <a:t>protokollen</a:t>
+            </a:r>
+            <a:endParaRPr lang="da-DK" dirty="0" smtClean="0"/>
           </a:p>
           <a:p>
             <a:pPr lvl="1">
@@ -6250,8 +6553,13 @@
             </a:pPr>
             <a:r>
               <a:rPr lang="da-DK" dirty="0" smtClean="0"/>
-              <a:t>Den mest udbredte DNS server</a:t>
-            </a:r>
+              <a:t>Den mest udbredte DNS </a:t>
+            </a:r>
+            <a:r>
+              <a:rPr lang="da-DK" dirty="0" smtClean="0"/>
+              <a:t>server software</a:t>
+            </a:r>
+            <a:endParaRPr lang="da-DK" dirty="0" smtClean="0"/>
           </a:p>
           <a:p>
             <a:pPr lvl="1">
@@ -6295,6 +6603,13 @@
   <p:clrMapOvr>
     <a:masterClrMapping/>
   </p:clrMapOvr>
+  <p:timing>
+    <p:tnLst>
+      <p:par>
+        <p:cTn id="1" dur="indefinite" restart="never" nodeType="tmRoot"/>
+      </p:par>
+    </p:tnLst>
+  </p:timing>
 </p:sld>
 </file>
 
@@ -6432,6 +6747,13 @@
   <p:clrMapOvr>
     <a:masterClrMapping/>
   </p:clrMapOvr>
+  <p:timing>
+    <p:tnLst>
+      <p:par>
+        <p:cTn id="1" dur="indefinite" restart="never" nodeType="tmRoot"/>
+      </p:par>
+    </p:tnLst>
+  </p:timing>
 </p:sld>
 </file>
 
@@ -6694,6 +7016,13 @@
   <p:clrMapOvr>
     <a:masterClrMapping/>
   </p:clrMapOvr>
+  <p:timing>
+    <p:tnLst>
+      <p:par>
+        <p:cTn id="1" dur="indefinite" restart="never" nodeType="tmRoot"/>
+      </p:par>
+    </p:tnLst>
+  </p:timing>
 </p:sld>
 </file>
 
@@ -6872,6 +7201,13 @@
   <p:clrMapOvr>
     <a:masterClrMapping/>
   </p:clrMapOvr>
+  <p:timing>
+    <p:tnLst>
+      <p:par>
+        <p:cTn id="1" dur="indefinite" restart="never" nodeType="tmRoot"/>
+      </p:par>
+    </p:tnLst>
+  </p:timing>
 </p:sld>
 </file>
 
@@ -6934,7 +7270,7 @@
           </p:nvPr>
         </p:nvPicPr>
         <p:blipFill>
-          <a:blip r:embed="rId2" cstate="print"/>
+          <a:blip r:embed="rId3" cstate="print"/>
           <a:stretch>
             <a:fillRect/>
           </a:stretch>
@@ -6954,6 +7290,13 @@
   <p:clrMapOvr>
     <a:masterClrMapping/>
   </p:clrMapOvr>
+  <p:timing>
+    <p:tnLst>
+      <p:par>
+        <p:cTn id="1" dur="indefinite" restart="never" nodeType="tmRoot"/>
+      </p:par>
+    </p:tnLst>
+  </p:timing>
 </p:sld>
 </file>
 
@@ -7032,6 +7375,7 @@
               <a:rPr lang="da-DK" sz="2800" dirty="0" smtClean="0"/>
               <a:t>Naming in distributed systems</a:t>
             </a:r>
+            <a:endParaRPr lang="da-DK" sz="2800" dirty="0" smtClean="0"/>
           </a:p>
           <a:p>
             <a:pPr>
@@ -7128,6 +7472,13 @@
   <p:clrMapOvr>
     <a:masterClrMapping/>
   </p:clrMapOvr>
+  <p:timing>
+    <p:tnLst>
+      <p:par>
+        <p:cTn id="1" dur="indefinite" restart="never" nodeType="tmRoot"/>
+      </p:par>
+    </p:tnLst>
+  </p:timing>
 </p:sld>
 </file>
 
@@ -7348,6 +7699,13 @@
   <p:clrMapOvr>
     <a:masterClrMapping/>
   </p:clrMapOvr>
+  <p:timing>
+    <p:tnLst>
+      <p:par>
+        <p:cTn id="1" dur="indefinite" restart="never" nodeType="tmRoot"/>
+      </p:par>
+    </p:tnLst>
+  </p:timing>
 </p:sld>
 </file>
 
@@ -7429,7 +7787,11 @@
             </a:pPr>
             <a:r>
               <a:rPr lang="da-DK" dirty="0" smtClean="0"/>
-              <a:t>Reference til en enhed</a:t>
+              <a:t>Refererer </a:t>
+            </a:r>
+            <a:r>
+              <a:rPr lang="da-DK" dirty="0" smtClean="0"/>
+              <a:t>til en enhed</a:t>
             </a:r>
           </a:p>
           <a:p>
@@ -7443,8 +7805,17 @@
             </a:pPr>
             <a:r>
               <a:rPr lang="da-DK" dirty="0" smtClean="0"/>
-              <a:t>Logisk navn vs. IP adresser</a:t>
-            </a:r>
+              <a:t>Logiske navne </a:t>
+            </a:r>
+            <a:r>
+              <a:rPr lang="da-DK" dirty="0" smtClean="0"/>
+              <a:t>vs. IP </a:t>
+            </a:r>
+            <a:r>
+              <a:rPr lang="da-DK" dirty="0" smtClean="0"/>
+              <a:t>adresser</a:t>
+            </a:r>
+            <a:endParaRPr lang="da-DK" dirty="0" smtClean="0"/>
           </a:p>
           <a:p>
             <a:pPr>
@@ -7517,6 +7888,13 @@
   <p:clrMapOvr>
     <a:masterClrMapping/>
   </p:clrMapOvr>
+  <p:timing>
+    <p:tnLst>
+      <p:par>
+        <p:cTn id="1" dur="indefinite" restart="never" nodeType="tmRoot"/>
+      </p:par>
+    </p:tnLst>
+  </p:timing>
 </p:sld>
 </file>
 
@@ -7598,7 +7976,11 @@
             </a:pPr>
             <a:r>
               <a:rPr lang="da-DK" dirty="0" smtClean="0"/>
-              <a:t>Reference til en enhed</a:t>
+              <a:t>Refererer </a:t>
+            </a:r>
+            <a:r>
+              <a:rPr lang="da-DK" dirty="0" smtClean="0"/>
+              <a:t>til en enhed</a:t>
             </a:r>
           </a:p>
           <a:p>
@@ -7612,7 +7994,11 @@
             </a:pPr>
             <a:r>
               <a:rPr lang="da-DK" dirty="0" smtClean="0"/>
-              <a:t>Logisk navn vs. IP adresser</a:t>
+              <a:t>Logiske navne </a:t>
+            </a:r>
+            <a:r>
+              <a:rPr lang="da-DK" dirty="0" smtClean="0"/>
+              <a:t>vs. IP adresser</a:t>
             </a:r>
           </a:p>
           <a:p>
@@ -7745,15 +8131,7 @@
                   <a:srgbClr val="C00000"/>
                 </a:solidFill>
               </a:rPr>
-              <a:t>          </a:t>
-            </a:r>
-            <a:r>
-              <a:rPr lang="da-DK" dirty="0" smtClean="0">
-                <a:solidFill>
-                  <a:srgbClr val="C00000"/>
-                </a:solidFill>
-              </a:rPr>
-              <a:t>DNS</a:t>
+              <a:t>          DNS</a:t>
             </a:r>
             <a:endParaRPr lang="da-DK" dirty="0">
               <a:solidFill>
@@ -7804,6 +8182,13 @@
   <p:clrMapOvr>
     <a:masterClrMapping/>
   </p:clrMapOvr>
+  <p:timing>
+    <p:tnLst>
+      <p:par>
+        <p:cTn id="1" dur="indefinite" restart="never" nodeType="tmRoot"/>
+      </p:par>
+    </p:tnLst>
+  </p:timing>
 </p:sld>
 </file>
 
@@ -8024,6 +8409,13 @@
   <p:clrMapOvr>
     <a:masterClrMapping/>
   </p:clrMapOvr>
+  <p:timing>
+    <p:tnLst>
+      <p:par>
+        <p:cTn id="1" dur="indefinite" restart="never" nodeType="tmRoot"/>
+      </p:par>
+    </p:tnLst>
+  </p:timing>
 </p:sld>
 </file>
 
@@ -8065,7 +8457,7 @@
                   <a:srgbClr val="C00000"/>
                 </a:solidFill>
               </a:rPr>
-              <a:t>DNS</a:t>
+              <a:t>Domain Name System</a:t>
             </a:r>
             <a:endParaRPr lang="da-DK" dirty="0">
               <a:solidFill>
@@ -8118,7 +8510,7 @@
         <p:spPr>
           <a:xfrm>
             <a:off x="607224" y="1591816"/>
-            <a:ext cx="7925216" cy="3709392"/>
+            <a:ext cx="7997224" cy="3997424"/>
           </a:xfrm>
         </p:spPr>
         <p:txBody>
@@ -8145,7 +8537,31 @@
             </a:pPr>
             <a:r>
               <a:rPr lang="da-DK" sz="2000" dirty="0" smtClean="0"/>
-              <a:t>Nu lokal HTL og distribueret database med 13 root servere</a:t>
+              <a:t>1982: DNS</a:t>
+            </a:r>
+            <a:endParaRPr lang="da-DK" sz="2000" dirty="0" smtClean="0"/>
+          </a:p>
+          <a:p>
+            <a:pPr lvl="1">
+              <a:buClr>
+                <a:srgbClr val="C00000"/>
+              </a:buClr>
+            </a:pPr>
+            <a:r>
+              <a:rPr lang="da-DK" sz="1800" dirty="0" smtClean="0"/>
+              <a:t>lokal </a:t>
+            </a:r>
+            <a:r>
+              <a:rPr lang="da-DK" sz="1800" dirty="0" smtClean="0"/>
+              <a:t>HTL og </a:t>
+            </a:r>
+            <a:r>
+              <a:rPr lang="da-DK" sz="1800" dirty="0" smtClean="0"/>
+              <a:t>distribueret hierarkisk </a:t>
+            </a:r>
+            <a:r>
+              <a:rPr lang="da-DK" sz="1800" dirty="0" smtClean="0"/>
+              <a:t>database med 13 root servere</a:t>
             </a:r>
           </a:p>
           <a:p>
@@ -8188,7 +8604,7 @@
             </a:pPr>
             <a:r>
               <a:rPr lang="da-DK" sz="2000" dirty="0" smtClean="0"/>
-              <a:t>A-record</a:t>
+              <a:t>Forskellige records, f.eks. A-record</a:t>
             </a:r>
             <a:endParaRPr lang="da-DK" sz="2000" dirty="0"/>
           </a:p>
@@ -8213,7 +8629,7 @@
         </p:blipFill>
         <p:spPr bwMode="auto">
           <a:xfrm>
-            <a:off x="539552" y="2780928"/>
+            <a:off x="611560" y="2996952"/>
             <a:ext cx="7920880" cy="1152128"/>
           </a:xfrm>
           <a:prstGeom prst="rect">
@@ -8233,6 +8649,13 @@
   <p:clrMapOvr>
     <a:masterClrMapping/>
   </p:clrMapOvr>
+  <p:timing>
+    <p:tnLst>
+      <p:par>
+        <p:cTn id="1" dur="indefinite" restart="never" nodeType="tmRoot"/>
+      </p:par>
+    </p:tnLst>
+  </p:timing>
 </p:sld>
 </file>
 
@@ -8469,6 +8892,13 @@
   <p:clrMapOvr>
     <a:masterClrMapping/>
   </p:clrMapOvr>
+  <p:timing>
+    <p:tnLst>
+      <p:par>
+        <p:cTn id="1" dur="indefinite" restart="never" nodeType="tmRoot"/>
+      </p:par>
+    </p:tnLst>
+  </p:timing>
 </p:sld>
 </file>
 
@@ -8559,6 +8989,13 @@
   <p:clrMapOvr>
     <a:masterClrMapping/>
   </p:clrMapOvr>
+  <p:timing>
+    <p:tnLst>
+      <p:par>
+        <p:cTn id="1" dur="indefinite" restart="never" nodeType="tmRoot"/>
+      </p:par>
+    </p:tnLst>
+  </p:timing>
 </p:sld>
 </file>
 

</xml_diff>

<commit_message>
Tilføjet noter til DNS slides
</commit_message>
<xml_diff>
--- a/Afleveringer/Eksamen/Domain Name System.pptx
+++ b/Afleveringer/Eksamen/Domain Name System.pptx
@@ -210,7 +210,7 @@
             <a:fld id="{2F982AAE-B938-4249-BAB5-25214BF85327}" type="datetimeFigureOut">
               <a:rPr lang="da-DK" smtClean="0"/>
               <a:pPr/>
-              <a:t>28-05-2013</a:t>
+              <a:t>28/05/13</a:t>
             </a:fld>
             <a:endParaRPr lang="da-DK"/>
           </a:p>
@@ -379,6 +379,11 @@
         </p:txBody>
       </p:sp>
     </p:spTree>
+    <p:extLst>
+      <p:ext uri="{BB962C8B-B14F-4D97-AF65-F5344CB8AC3E}">
+        <p14:creationId xmlns:p14="http://schemas.microsoft.com/office/powerpoint/2010/main" val="1077962519"/>
+      </p:ext>
+    </p:extLst>
   </p:cSld>
   <p:clrMap bg1="lt1" tx1="dk1" bg2="lt2" tx2="dk2" accent1="accent1" accent2="accent2" accent3="accent3" accent4="accent4" accent5="accent5" accent6="accent6" hlink="hlink" folHlink="folHlink"/>
   <p:notesStyle>
@@ -1221,6 +1226,1953 @@
               <a:rPr lang="da-DK" dirty="0" smtClean="0"/>
               <a:t>Lasse</a:t>
             </a:r>
+          </a:p>
+          <a:p>
+            <a:r>
+              <a:rPr lang="en-US" sz="1200" b="1" kern="1200" dirty="0" smtClean="0">
+                <a:solidFill>
+                  <a:schemeClr val="tx1"/>
+                </a:solidFill>
+                <a:latin typeface="+mn-lt"/>
+                <a:ea typeface="+mn-ea"/>
+                <a:cs typeface="+mn-cs"/>
+              </a:rPr>
+              <a:t>Flat</a:t>
+            </a:r>
+            <a:endParaRPr lang="en-US" sz="1200" b="0" kern="1200" dirty="0" smtClean="0">
+              <a:solidFill>
+                <a:schemeClr val="tx1"/>
+              </a:solidFill>
+              <a:latin typeface="+mn-lt"/>
+              <a:ea typeface="+mn-ea"/>
+              <a:cs typeface="+mn-cs"/>
+            </a:endParaRPr>
+          </a:p>
+          <a:p>
+            <a:pPr marL="171450" indent="-171450">
+              <a:buFontTx/>
+              <a:buChar char="-"/>
+            </a:pPr>
+            <a:r>
+              <a:rPr lang="en-US" sz="1200" b="0" kern="1200" dirty="0" err="1" smtClean="0">
+                <a:solidFill>
+                  <a:schemeClr val="tx1"/>
+                </a:solidFill>
+                <a:latin typeface="+mn-lt"/>
+                <a:ea typeface="+mn-ea"/>
+                <a:cs typeface="+mn-cs"/>
+              </a:rPr>
+              <a:t>Identifieres</a:t>
+            </a:r>
+            <a:r>
+              <a:rPr lang="en-US" sz="1200" b="0" kern="1200" dirty="0" smtClean="0">
+                <a:solidFill>
+                  <a:schemeClr val="tx1"/>
+                </a:solidFill>
+                <a:latin typeface="+mn-lt"/>
+                <a:ea typeface="+mn-ea"/>
+                <a:cs typeface="+mn-cs"/>
+              </a:rPr>
+              <a:t> </a:t>
+            </a:r>
+            <a:r>
+              <a:rPr lang="en-US" sz="1200" b="0" kern="1200" dirty="0" err="1" smtClean="0">
+                <a:solidFill>
+                  <a:schemeClr val="tx1"/>
+                </a:solidFill>
+                <a:latin typeface="+mn-lt"/>
+                <a:ea typeface="+mn-ea"/>
+                <a:cs typeface="+mn-cs"/>
+              </a:rPr>
+              <a:t>er</a:t>
+            </a:r>
+            <a:r>
+              <a:rPr lang="en-US" sz="1200" b="0" kern="1200" dirty="0" smtClean="0">
+                <a:solidFill>
+                  <a:schemeClr val="tx1"/>
+                </a:solidFill>
+                <a:latin typeface="+mn-lt"/>
+                <a:ea typeface="+mn-ea"/>
+                <a:cs typeface="+mn-cs"/>
+              </a:rPr>
+              <a:t> random bit strings -&gt; </a:t>
+            </a:r>
+            <a:r>
+              <a:rPr lang="en-US" sz="1200" b="0" kern="1200" dirty="0" err="1" smtClean="0">
+                <a:solidFill>
+                  <a:schemeClr val="tx1"/>
+                </a:solidFill>
+                <a:latin typeface="+mn-lt"/>
+                <a:ea typeface="+mn-ea"/>
+                <a:cs typeface="+mn-cs"/>
+              </a:rPr>
+              <a:t>ustrukturet</a:t>
+            </a:r>
+            <a:endParaRPr lang="en-US" sz="1200" b="0" kern="1200" dirty="0" smtClean="0">
+              <a:solidFill>
+                <a:schemeClr val="tx1"/>
+              </a:solidFill>
+              <a:latin typeface="+mn-lt"/>
+              <a:ea typeface="+mn-ea"/>
+              <a:cs typeface="+mn-cs"/>
+            </a:endParaRPr>
+          </a:p>
+          <a:p>
+            <a:pPr marL="171450" indent="-171450">
+              <a:buFontTx/>
+              <a:buChar char="-"/>
+            </a:pPr>
+            <a:r>
+              <a:rPr lang="en-US" sz="1200" b="0" kern="1200" dirty="0" err="1" smtClean="0">
+                <a:solidFill>
+                  <a:schemeClr val="tx1"/>
+                </a:solidFill>
+                <a:latin typeface="+mn-lt"/>
+                <a:ea typeface="+mn-ea"/>
+                <a:cs typeface="+mn-cs"/>
+              </a:rPr>
+              <a:t>Angiver</a:t>
+            </a:r>
+            <a:r>
+              <a:rPr lang="en-US" sz="1200" b="0" kern="1200" dirty="0" smtClean="0">
+                <a:solidFill>
+                  <a:schemeClr val="tx1"/>
+                </a:solidFill>
+                <a:latin typeface="+mn-lt"/>
+                <a:ea typeface="+mn-ea"/>
+                <a:cs typeface="+mn-cs"/>
+              </a:rPr>
+              <a:t> </a:t>
+            </a:r>
+            <a:r>
+              <a:rPr lang="en-US" sz="1200" b="1" kern="1200" dirty="0" err="1" smtClean="0">
+                <a:solidFill>
+                  <a:schemeClr val="tx1"/>
+                </a:solidFill>
+                <a:latin typeface="+mn-lt"/>
+                <a:ea typeface="+mn-ea"/>
+                <a:cs typeface="+mn-cs"/>
+              </a:rPr>
+              <a:t>ingen</a:t>
+            </a:r>
+            <a:r>
+              <a:rPr lang="en-US" sz="1200" b="0" kern="1200" dirty="0" smtClean="0">
+                <a:solidFill>
+                  <a:schemeClr val="tx1"/>
+                </a:solidFill>
+                <a:latin typeface="+mn-lt"/>
+                <a:ea typeface="+mn-ea"/>
+                <a:cs typeface="+mn-cs"/>
+              </a:rPr>
+              <a:t> information </a:t>
+            </a:r>
+            <a:r>
+              <a:rPr lang="en-US" sz="1200" b="0" kern="1200" dirty="0" err="1" smtClean="0">
+                <a:solidFill>
+                  <a:schemeClr val="tx1"/>
+                </a:solidFill>
+                <a:latin typeface="+mn-lt"/>
+                <a:ea typeface="+mn-ea"/>
+                <a:cs typeface="+mn-cs"/>
+              </a:rPr>
+              <a:t>på</a:t>
+            </a:r>
+            <a:r>
+              <a:rPr lang="en-US" sz="1200" b="0" kern="1200" dirty="0" smtClean="0">
+                <a:solidFill>
+                  <a:schemeClr val="tx1"/>
+                </a:solidFill>
+                <a:latin typeface="+mn-lt"/>
+                <a:ea typeface="+mn-ea"/>
+                <a:cs typeface="+mn-cs"/>
+              </a:rPr>
+              <a:t> </a:t>
+            </a:r>
+            <a:r>
+              <a:rPr lang="en-US" sz="1200" b="0" kern="1200" dirty="0" err="1" smtClean="0">
+                <a:solidFill>
+                  <a:schemeClr val="tx1"/>
+                </a:solidFill>
+                <a:latin typeface="+mn-lt"/>
+                <a:ea typeface="+mn-ea"/>
+                <a:cs typeface="+mn-cs"/>
+              </a:rPr>
+              <a:t>hvordan</a:t>
+            </a:r>
+            <a:r>
+              <a:rPr lang="en-US" sz="1200" b="0" kern="1200" dirty="0" smtClean="0">
+                <a:solidFill>
+                  <a:schemeClr val="tx1"/>
+                </a:solidFill>
+                <a:latin typeface="+mn-lt"/>
+                <a:ea typeface="+mn-ea"/>
+                <a:cs typeface="+mn-cs"/>
+              </a:rPr>
+              <a:t> man </a:t>
+            </a:r>
+            <a:r>
+              <a:rPr lang="en-US" sz="1200" b="0" kern="1200" dirty="0" err="1" smtClean="0">
+                <a:solidFill>
+                  <a:schemeClr val="tx1"/>
+                </a:solidFill>
+                <a:latin typeface="+mn-lt"/>
+                <a:ea typeface="+mn-ea"/>
+                <a:cs typeface="+mn-cs"/>
+              </a:rPr>
+              <a:t>får</a:t>
+            </a:r>
+            <a:r>
+              <a:rPr lang="en-US" sz="1200" b="0" kern="1200" dirty="0" smtClean="0">
+                <a:solidFill>
+                  <a:schemeClr val="tx1"/>
+                </a:solidFill>
+                <a:latin typeface="+mn-lt"/>
+                <a:ea typeface="+mn-ea"/>
+                <a:cs typeface="+mn-cs"/>
+              </a:rPr>
+              <a:t> fat </a:t>
+            </a:r>
+            <a:r>
+              <a:rPr lang="en-US" sz="1200" b="0" kern="1200" dirty="0" err="1" smtClean="0">
+                <a:solidFill>
+                  <a:schemeClr val="tx1"/>
+                </a:solidFill>
+                <a:latin typeface="+mn-lt"/>
+                <a:ea typeface="+mn-ea"/>
+                <a:cs typeface="+mn-cs"/>
+              </a:rPr>
+              <a:t>i</a:t>
+            </a:r>
+            <a:r>
+              <a:rPr lang="en-US" sz="1200" b="0" kern="1200" dirty="0" smtClean="0">
+                <a:solidFill>
+                  <a:schemeClr val="tx1"/>
+                </a:solidFill>
+                <a:latin typeface="+mn-lt"/>
+                <a:ea typeface="+mn-ea"/>
+                <a:cs typeface="+mn-cs"/>
+              </a:rPr>
+              <a:t> </a:t>
+            </a:r>
+            <a:r>
+              <a:rPr lang="en-US" sz="1200" b="0" kern="1200" dirty="0" err="1" smtClean="0">
+                <a:solidFill>
+                  <a:schemeClr val="tx1"/>
+                </a:solidFill>
+                <a:latin typeface="+mn-lt"/>
+                <a:ea typeface="+mn-ea"/>
+                <a:cs typeface="+mn-cs"/>
+              </a:rPr>
+              <a:t>det</a:t>
+            </a:r>
+            <a:r>
+              <a:rPr lang="en-US" sz="1200" b="0" kern="1200" dirty="0" smtClean="0">
+                <a:solidFill>
+                  <a:schemeClr val="tx1"/>
+                </a:solidFill>
+                <a:latin typeface="+mn-lt"/>
+                <a:ea typeface="+mn-ea"/>
+                <a:cs typeface="+mn-cs"/>
+              </a:rPr>
+              <a:t> given access point for den given </a:t>
+            </a:r>
+            <a:r>
+              <a:rPr lang="en-US" sz="1200" b="0" kern="1200" dirty="0" err="1" smtClean="0">
+                <a:solidFill>
+                  <a:schemeClr val="tx1"/>
+                </a:solidFill>
+                <a:latin typeface="+mn-lt"/>
+                <a:ea typeface="+mn-ea"/>
+                <a:cs typeface="+mn-cs"/>
+              </a:rPr>
+              <a:t>enhed</a:t>
+            </a:r>
+            <a:endParaRPr lang="en-US" sz="1200" b="0" kern="1200" dirty="0" smtClean="0">
+              <a:solidFill>
+                <a:schemeClr val="tx1"/>
+              </a:solidFill>
+              <a:latin typeface="+mn-lt"/>
+              <a:ea typeface="+mn-ea"/>
+              <a:cs typeface="+mn-cs"/>
+            </a:endParaRPr>
+          </a:p>
+          <a:p>
+            <a:pPr marL="171450" indent="-171450">
+              <a:buFontTx/>
+              <a:buChar char="-"/>
+            </a:pPr>
+            <a:r>
+              <a:rPr lang="en-US" sz="1200" b="0" kern="1200" dirty="0" err="1" smtClean="0">
+                <a:solidFill>
+                  <a:schemeClr val="tx1"/>
+                </a:solidFill>
+                <a:latin typeface="+mn-lt"/>
+                <a:ea typeface="+mn-ea"/>
+                <a:cs typeface="+mn-cs"/>
+              </a:rPr>
+              <a:t>Godt</a:t>
+            </a:r>
+            <a:r>
+              <a:rPr lang="en-US" sz="1200" b="0" kern="1200" dirty="0" smtClean="0">
+                <a:solidFill>
+                  <a:schemeClr val="tx1"/>
+                </a:solidFill>
+                <a:latin typeface="+mn-lt"/>
+                <a:ea typeface="+mn-ea"/>
+                <a:cs typeface="+mn-cs"/>
+              </a:rPr>
+              <a:t> for </a:t>
+            </a:r>
+            <a:r>
+              <a:rPr lang="en-US" sz="1200" b="0" kern="1200" dirty="0" err="1" smtClean="0">
+                <a:solidFill>
+                  <a:schemeClr val="tx1"/>
+                </a:solidFill>
+                <a:latin typeface="+mn-lt"/>
+                <a:ea typeface="+mn-ea"/>
+                <a:cs typeface="+mn-cs"/>
+              </a:rPr>
+              <a:t>maskiner</a:t>
+            </a:r>
+            <a:r>
+              <a:rPr lang="en-US" sz="1200" b="0" kern="1200" dirty="0" smtClean="0">
+                <a:solidFill>
+                  <a:schemeClr val="tx1"/>
+                </a:solidFill>
+                <a:latin typeface="+mn-lt"/>
+                <a:ea typeface="+mn-ea"/>
+                <a:cs typeface="+mn-cs"/>
+              </a:rPr>
+              <a:t> -&gt; </a:t>
+            </a:r>
+            <a:r>
+              <a:rPr lang="en-US" sz="1200" b="0" kern="1200" dirty="0" err="1" smtClean="0">
+                <a:solidFill>
+                  <a:schemeClr val="tx1"/>
+                </a:solidFill>
+                <a:latin typeface="+mn-lt"/>
+                <a:ea typeface="+mn-ea"/>
+                <a:cs typeface="+mn-cs"/>
+              </a:rPr>
+              <a:t>ikke</a:t>
+            </a:r>
+            <a:r>
+              <a:rPr lang="en-US" sz="1200" b="0" kern="1200" dirty="0" smtClean="0">
+                <a:solidFill>
+                  <a:schemeClr val="tx1"/>
+                </a:solidFill>
+                <a:latin typeface="+mn-lt"/>
+                <a:ea typeface="+mn-ea"/>
+                <a:cs typeface="+mn-cs"/>
+              </a:rPr>
+              <a:t> for </a:t>
+            </a:r>
+            <a:r>
+              <a:rPr lang="en-US" sz="1200" b="0" kern="1200" dirty="0" err="1" smtClean="0">
+                <a:solidFill>
+                  <a:schemeClr val="tx1"/>
+                </a:solidFill>
+                <a:latin typeface="+mn-lt"/>
+                <a:ea typeface="+mn-ea"/>
+                <a:cs typeface="+mn-cs"/>
+              </a:rPr>
+              <a:t>mennesker</a:t>
+            </a:r>
+            <a:r>
+              <a:rPr lang="en-US" sz="1200" b="0" kern="1200" dirty="0" smtClean="0">
+                <a:solidFill>
+                  <a:schemeClr val="tx1"/>
+                </a:solidFill>
+                <a:latin typeface="+mn-lt"/>
+                <a:ea typeface="+mn-ea"/>
+                <a:cs typeface="+mn-cs"/>
+              </a:rPr>
+              <a:t>.</a:t>
+            </a:r>
+          </a:p>
+          <a:p>
+            <a:pPr marL="171450" indent="-171450">
+              <a:buFontTx/>
+              <a:buChar char="-"/>
+            </a:pPr>
+            <a:endParaRPr lang="en-US" sz="1200" b="0" kern="1200" dirty="0" smtClean="0">
+              <a:solidFill>
+                <a:schemeClr val="tx1"/>
+              </a:solidFill>
+              <a:latin typeface="+mn-lt"/>
+              <a:ea typeface="+mn-ea"/>
+              <a:cs typeface="+mn-cs"/>
+            </a:endParaRPr>
+          </a:p>
+          <a:p>
+            <a:pPr marL="0" indent="0">
+              <a:buFontTx/>
+              <a:buNone/>
+            </a:pPr>
+            <a:r>
+              <a:rPr lang="en-US" sz="1200" b="1" kern="1200" dirty="0" smtClean="0">
+                <a:solidFill>
+                  <a:schemeClr val="tx1"/>
+                </a:solidFill>
+                <a:latin typeface="+mn-lt"/>
+                <a:ea typeface="+mn-ea"/>
+                <a:cs typeface="+mn-cs"/>
+              </a:rPr>
+              <a:t>Structured</a:t>
+            </a:r>
+            <a:endParaRPr lang="en-US" sz="1200" b="0" kern="1200" dirty="0" smtClean="0">
+              <a:solidFill>
+                <a:schemeClr val="tx1"/>
+              </a:solidFill>
+              <a:latin typeface="+mn-lt"/>
+              <a:ea typeface="+mn-ea"/>
+              <a:cs typeface="+mn-cs"/>
+            </a:endParaRPr>
+          </a:p>
+          <a:p>
+            <a:pPr marL="171450" indent="-171450">
+              <a:buFontTx/>
+              <a:buChar char="-"/>
+            </a:pPr>
+            <a:r>
+              <a:rPr lang="en-US" sz="1200" b="0" kern="1200" dirty="0" err="1" smtClean="0">
+                <a:solidFill>
+                  <a:schemeClr val="tx1"/>
+                </a:solidFill>
+                <a:latin typeface="+mn-lt"/>
+                <a:ea typeface="+mn-ea"/>
+                <a:cs typeface="+mn-cs"/>
+              </a:rPr>
+              <a:t>Menneske</a:t>
+            </a:r>
+            <a:r>
+              <a:rPr lang="en-US" sz="1200" b="0" kern="1200" dirty="0" smtClean="0">
+                <a:solidFill>
+                  <a:schemeClr val="tx1"/>
+                </a:solidFill>
+                <a:latin typeface="+mn-lt"/>
+                <a:ea typeface="+mn-ea"/>
+                <a:cs typeface="+mn-cs"/>
+              </a:rPr>
+              <a:t> </a:t>
+            </a:r>
+            <a:r>
+              <a:rPr lang="en-US" sz="1200" b="0" kern="1200" dirty="0" err="1" smtClean="0">
+                <a:solidFill>
+                  <a:schemeClr val="tx1"/>
+                </a:solidFill>
+                <a:latin typeface="+mn-lt"/>
+                <a:ea typeface="+mn-ea"/>
+                <a:cs typeface="+mn-cs"/>
+              </a:rPr>
+              <a:t>læseligt</a:t>
+            </a:r>
+            <a:endParaRPr lang="en-US" sz="1200" b="0" kern="1200" dirty="0" smtClean="0">
+              <a:solidFill>
+                <a:schemeClr val="tx1"/>
+              </a:solidFill>
+              <a:latin typeface="+mn-lt"/>
+              <a:ea typeface="+mn-ea"/>
+              <a:cs typeface="+mn-cs"/>
+            </a:endParaRPr>
+          </a:p>
+          <a:p>
+            <a:pPr marL="171450" indent="-171450">
+              <a:buFontTx/>
+              <a:buChar char="-"/>
+            </a:pPr>
+            <a:r>
+              <a:rPr lang="en-US" sz="1200" b="0" kern="1200" dirty="0" err="1" smtClean="0">
+                <a:solidFill>
+                  <a:schemeClr val="tx1"/>
+                </a:solidFill>
+                <a:latin typeface="+mn-lt"/>
+                <a:ea typeface="+mn-ea"/>
+                <a:cs typeface="+mn-cs"/>
+              </a:rPr>
+              <a:t>Strukturet</a:t>
+            </a:r>
+            <a:r>
+              <a:rPr lang="en-US" sz="1200" b="0" kern="1200" dirty="0" smtClean="0">
+                <a:solidFill>
+                  <a:schemeClr val="tx1"/>
+                </a:solidFill>
+                <a:latin typeface="+mn-lt"/>
+                <a:ea typeface="+mn-ea"/>
+                <a:cs typeface="+mn-cs"/>
+              </a:rPr>
+              <a:t> </a:t>
+            </a:r>
+            <a:r>
+              <a:rPr lang="en-US" sz="1200" b="0" kern="1200" dirty="0" err="1" smtClean="0">
+                <a:solidFill>
+                  <a:schemeClr val="tx1"/>
+                </a:solidFill>
+                <a:latin typeface="+mn-lt"/>
+                <a:ea typeface="+mn-ea"/>
+                <a:cs typeface="+mn-cs"/>
+              </a:rPr>
+              <a:t>navne</a:t>
+            </a:r>
+            <a:r>
+              <a:rPr lang="en-US" sz="1200" b="0" kern="1200" dirty="0" smtClean="0">
+                <a:solidFill>
+                  <a:schemeClr val="tx1"/>
+                </a:solidFill>
+                <a:latin typeface="+mn-lt"/>
+                <a:ea typeface="+mn-ea"/>
+                <a:cs typeface="+mn-cs"/>
+              </a:rPr>
+              <a:t> -&gt; </a:t>
+            </a:r>
+            <a:r>
+              <a:rPr lang="en-US" sz="1200" b="0" kern="1200" dirty="0" err="1" smtClean="0">
+                <a:solidFill>
+                  <a:schemeClr val="tx1"/>
+                </a:solidFill>
+                <a:latin typeface="+mn-lt"/>
+                <a:ea typeface="+mn-ea"/>
+                <a:cs typeface="+mn-cs"/>
+              </a:rPr>
+              <a:t>sekvenser</a:t>
+            </a:r>
+            <a:r>
+              <a:rPr lang="en-US" sz="1200" b="0" kern="1200" dirty="0" smtClean="0">
+                <a:solidFill>
+                  <a:schemeClr val="tx1"/>
+                </a:solidFill>
+                <a:latin typeface="+mn-lt"/>
+                <a:ea typeface="+mn-ea"/>
+                <a:cs typeface="+mn-cs"/>
+              </a:rPr>
+              <a:t> </a:t>
+            </a:r>
+            <a:r>
+              <a:rPr lang="en-US" sz="1200" b="0" kern="1200" dirty="0" err="1" smtClean="0">
+                <a:solidFill>
+                  <a:schemeClr val="tx1"/>
+                </a:solidFill>
+                <a:latin typeface="+mn-lt"/>
+                <a:ea typeface="+mn-ea"/>
+                <a:cs typeface="+mn-cs"/>
+              </a:rPr>
+              <a:t>af</a:t>
+            </a:r>
+            <a:r>
+              <a:rPr lang="en-US" sz="1200" b="0" kern="1200" dirty="0" smtClean="0">
+                <a:solidFill>
+                  <a:schemeClr val="tx1"/>
+                </a:solidFill>
+                <a:latin typeface="+mn-lt"/>
+                <a:ea typeface="+mn-ea"/>
+                <a:cs typeface="+mn-cs"/>
+              </a:rPr>
+              <a:t> </a:t>
+            </a:r>
+            <a:r>
+              <a:rPr lang="en-US" sz="1200" b="0" kern="1200" dirty="0" err="1" smtClean="0">
+                <a:solidFill>
+                  <a:schemeClr val="tx1"/>
+                </a:solidFill>
+                <a:latin typeface="+mn-lt"/>
+                <a:ea typeface="+mn-ea"/>
+                <a:cs typeface="+mn-cs"/>
+              </a:rPr>
+              <a:t>ord</a:t>
+            </a:r>
+            <a:endParaRPr lang="en-US" sz="1200" b="0" kern="1200" dirty="0" smtClean="0">
+              <a:solidFill>
+                <a:schemeClr val="tx1"/>
+              </a:solidFill>
+              <a:latin typeface="+mn-lt"/>
+              <a:ea typeface="+mn-ea"/>
+              <a:cs typeface="+mn-cs"/>
+            </a:endParaRPr>
+          </a:p>
+          <a:p>
+            <a:pPr marL="171450" indent="-171450">
+              <a:buFontTx/>
+              <a:buChar char="-"/>
+            </a:pPr>
+            <a:r>
+              <a:rPr lang="en-US" sz="1200" b="0" kern="1200" dirty="0" err="1" smtClean="0">
+                <a:solidFill>
+                  <a:schemeClr val="tx1"/>
+                </a:solidFill>
+                <a:latin typeface="+mn-lt"/>
+                <a:ea typeface="+mn-ea"/>
+                <a:cs typeface="+mn-cs"/>
+              </a:rPr>
+              <a:t>Navne</a:t>
+            </a:r>
+            <a:r>
+              <a:rPr lang="en-US" sz="1200" b="0" kern="1200" dirty="0" smtClean="0">
+                <a:solidFill>
+                  <a:schemeClr val="tx1"/>
+                </a:solidFill>
+                <a:latin typeface="+mn-lt"/>
+                <a:ea typeface="+mn-ea"/>
+                <a:cs typeface="+mn-cs"/>
+              </a:rPr>
+              <a:t> </a:t>
+            </a:r>
+            <a:r>
+              <a:rPr lang="en-US" sz="1200" b="0" kern="1200" dirty="0" err="1" smtClean="0">
+                <a:solidFill>
+                  <a:schemeClr val="tx1"/>
+                </a:solidFill>
+                <a:latin typeface="+mn-lt"/>
+                <a:ea typeface="+mn-ea"/>
+                <a:cs typeface="+mn-cs"/>
+              </a:rPr>
+              <a:t>er</a:t>
+            </a:r>
+            <a:r>
+              <a:rPr lang="en-US" sz="1200" b="0" kern="1200" dirty="0" smtClean="0">
+                <a:solidFill>
+                  <a:schemeClr val="tx1"/>
+                </a:solidFill>
+                <a:latin typeface="+mn-lt"/>
+                <a:ea typeface="+mn-ea"/>
+                <a:cs typeface="+mn-cs"/>
+              </a:rPr>
+              <a:t> </a:t>
+            </a:r>
+            <a:r>
+              <a:rPr lang="en-US" sz="1200" b="0" kern="1200" dirty="0" err="1" smtClean="0">
+                <a:solidFill>
+                  <a:schemeClr val="tx1"/>
+                </a:solidFill>
+                <a:latin typeface="+mn-lt"/>
+                <a:ea typeface="+mn-ea"/>
+                <a:cs typeface="+mn-cs"/>
+              </a:rPr>
+              <a:t>organiseret</a:t>
+            </a:r>
+            <a:r>
+              <a:rPr lang="en-US" sz="1200" b="0" kern="1200" dirty="0" smtClean="0">
+                <a:solidFill>
+                  <a:schemeClr val="tx1"/>
+                </a:solidFill>
+                <a:latin typeface="+mn-lt"/>
+                <a:ea typeface="+mn-ea"/>
+                <a:cs typeface="+mn-cs"/>
+              </a:rPr>
+              <a:t> </a:t>
+            </a:r>
+            <a:r>
+              <a:rPr lang="en-US" sz="1200" b="0" kern="1200" dirty="0" err="1" smtClean="0">
+                <a:solidFill>
+                  <a:schemeClr val="tx1"/>
+                </a:solidFill>
+                <a:latin typeface="+mn-lt"/>
+                <a:ea typeface="+mn-ea"/>
+                <a:cs typeface="+mn-cs"/>
+              </a:rPr>
+              <a:t>i</a:t>
+            </a:r>
+            <a:r>
+              <a:rPr lang="en-US" sz="1200" b="0" kern="1200" dirty="0" smtClean="0">
+                <a:solidFill>
+                  <a:schemeClr val="tx1"/>
+                </a:solidFill>
+                <a:latin typeface="+mn-lt"/>
+                <a:ea typeface="+mn-ea"/>
+                <a:cs typeface="+mn-cs"/>
+              </a:rPr>
+              <a:t> et "Name space" -&gt; </a:t>
+            </a:r>
+            <a:r>
+              <a:rPr lang="en-US" sz="1200" b="0" kern="1200" dirty="0" err="1" smtClean="0">
+                <a:solidFill>
+                  <a:schemeClr val="tx1"/>
+                </a:solidFill>
+                <a:latin typeface="+mn-lt"/>
+                <a:ea typeface="+mn-ea"/>
+                <a:cs typeface="+mn-cs"/>
+              </a:rPr>
+              <a:t>Kan</a:t>
+            </a:r>
+            <a:r>
+              <a:rPr lang="en-US" sz="1200" b="0" kern="1200" dirty="0" smtClean="0">
+                <a:solidFill>
+                  <a:schemeClr val="tx1"/>
+                </a:solidFill>
+                <a:latin typeface="+mn-lt"/>
+                <a:ea typeface="+mn-ea"/>
+                <a:cs typeface="+mn-cs"/>
+              </a:rPr>
+              <a:t> </a:t>
+            </a:r>
+            <a:r>
+              <a:rPr lang="en-US" sz="1200" b="0" kern="1200" dirty="0" err="1" smtClean="0">
+                <a:solidFill>
+                  <a:schemeClr val="tx1"/>
+                </a:solidFill>
+                <a:latin typeface="+mn-lt"/>
+                <a:ea typeface="+mn-ea"/>
+                <a:cs typeface="+mn-cs"/>
+              </a:rPr>
+              <a:t>blive</a:t>
+            </a:r>
+            <a:r>
+              <a:rPr lang="en-US" sz="1200" b="0" kern="1200" dirty="0" smtClean="0">
+                <a:solidFill>
+                  <a:schemeClr val="tx1"/>
+                </a:solidFill>
+                <a:latin typeface="+mn-lt"/>
+                <a:ea typeface="+mn-ea"/>
+                <a:cs typeface="+mn-cs"/>
+              </a:rPr>
+              <a:t> </a:t>
+            </a:r>
+            <a:r>
+              <a:rPr lang="en-US" sz="1200" b="0" kern="1200" dirty="0" err="1" smtClean="0">
+                <a:solidFill>
+                  <a:schemeClr val="tx1"/>
+                </a:solidFill>
+                <a:latin typeface="+mn-lt"/>
+                <a:ea typeface="+mn-ea"/>
+                <a:cs typeface="+mn-cs"/>
+              </a:rPr>
+              <a:t>repræsenteret</a:t>
+            </a:r>
+            <a:r>
+              <a:rPr lang="en-US" sz="1200" b="0" kern="1200" dirty="0" smtClean="0">
+                <a:solidFill>
+                  <a:schemeClr val="tx1"/>
+                </a:solidFill>
+                <a:latin typeface="+mn-lt"/>
+                <a:ea typeface="+mn-ea"/>
+                <a:cs typeface="+mn-cs"/>
+              </a:rPr>
+              <a:t> </a:t>
+            </a:r>
+            <a:r>
+              <a:rPr lang="en-US" sz="1200" b="0" kern="1200" dirty="0" err="1" smtClean="0">
+                <a:solidFill>
+                  <a:schemeClr val="tx1"/>
+                </a:solidFill>
+                <a:latin typeface="+mn-lt"/>
+                <a:ea typeface="+mn-ea"/>
+                <a:cs typeface="+mn-cs"/>
+              </a:rPr>
+              <a:t>ved</a:t>
+            </a:r>
+            <a:r>
+              <a:rPr lang="en-US" sz="1200" b="0" kern="1200" dirty="0" smtClean="0">
+                <a:solidFill>
+                  <a:schemeClr val="tx1"/>
+                </a:solidFill>
+                <a:latin typeface="+mn-lt"/>
+                <a:ea typeface="+mn-ea"/>
+                <a:cs typeface="+mn-cs"/>
+              </a:rPr>
+              <a:t> en "Naming Graf". Her </a:t>
+            </a:r>
+            <a:r>
+              <a:rPr lang="en-US" sz="1200" b="0" kern="1200" dirty="0" err="1" smtClean="0">
+                <a:solidFill>
+                  <a:schemeClr val="tx1"/>
+                </a:solidFill>
+                <a:latin typeface="+mn-lt"/>
+                <a:ea typeface="+mn-ea"/>
+                <a:cs typeface="+mn-cs"/>
+              </a:rPr>
+              <a:t>gemmes</a:t>
+            </a:r>
+            <a:r>
+              <a:rPr lang="en-US" sz="1200" b="0" kern="1200" dirty="0" smtClean="0">
+                <a:solidFill>
+                  <a:schemeClr val="tx1"/>
+                </a:solidFill>
+                <a:latin typeface="+mn-lt"/>
+                <a:ea typeface="+mn-ea"/>
+                <a:cs typeface="+mn-cs"/>
+              </a:rPr>
+              <a:t> information </a:t>
+            </a:r>
+            <a:r>
+              <a:rPr lang="en-US" sz="1200" b="0" kern="1200" dirty="0" err="1" smtClean="0">
+                <a:solidFill>
+                  <a:schemeClr val="tx1"/>
+                </a:solidFill>
+                <a:latin typeface="+mn-lt"/>
+                <a:ea typeface="+mn-ea"/>
+                <a:cs typeface="+mn-cs"/>
+              </a:rPr>
+              <a:t>om</a:t>
+            </a:r>
+            <a:r>
+              <a:rPr lang="en-US" sz="1200" b="0" kern="1200" dirty="0" smtClean="0">
+                <a:solidFill>
+                  <a:schemeClr val="tx1"/>
+                </a:solidFill>
+                <a:latin typeface="+mn-lt"/>
+                <a:ea typeface="+mn-ea"/>
+                <a:cs typeface="+mn-cs"/>
+              </a:rPr>
+              <a:t> </a:t>
+            </a:r>
+            <a:r>
+              <a:rPr lang="en-US" sz="1200" b="0" kern="1200" dirty="0" err="1" smtClean="0">
+                <a:solidFill>
+                  <a:schemeClr val="tx1"/>
+                </a:solidFill>
+                <a:latin typeface="+mn-lt"/>
+                <a:ea typeface="+mn-ea"/>
+                <a:cs typeface="+mn-cs"/>
+              </a:rPr>
+              <a:t>enheder</a:t>
+            </a:r>
+            <a:r>
+              <a:rPr lang="en-US" sz="1200" b="0" kern="1200" dirty="0" smtClean="0">
+                <a:solidFill>
+                  <a:schemeClr val="tx1"/>
+                </a:solidFill>
+                <a:latin typeface="+mn-lt"/>
+                <a:ea typeface="+mn-ea"/>
+                <a:cs typeface="+mn-cs"/>
+              </a:rPr>
+              <a:t> </a:t>
+            </a:r>
+            <a:r>
+              <a:rPr lang="en-US" sz="1200" b="0" kern="1200" dirty="0" err="1" smtClean="0">
+                <a:solidFill>
+                  <a:schemeClr val="tx1"/>
+                </a:solidFill>
+                <a:latin typeface="+mn-lt"/>
+                <a:ea typeface="+mn-ea"/>
+                <a:cs typeface="+mn-cs"/>
+              </a:rPr>
+              <a:t>ved</a:t>
+            </a:r>
+            <a:r>
+              <a:rPr lang="en-US" sz="1200" b="0" kern="1200" dirty="0" smtClean="0">
+                <a:solidFill>
+                  <a:schemeClr val="tx1"/>
+                </a:solidFill>
+                <a:latin typeface="+mn-lt"/>
+                <a:ea typeface="+mn-ea"/>
+                <a:cs typeface="+mn-cs"/>
+              </a:rPr>
+              <a:t> </a:t>
+            </a:r>
+            <a:r>
+              <a:rPr lang="en-US" sz="1200" b="0" kern="1200" dirty="0" err="1" smtClean="0">
+                <a:solidFill>
+                  <a:schemeClr val="tx1"/>
+                </a:solidFill>
+                <a:latin typeface="+mn-lt"/>
+                <a:ea typeface="+mn-ea"/>
+                <a:cs typeface="+mn-cs"/>
+              </a:rPr>
+              <a:t>brug</a:t>
+            </a:r>
+            <a:r>
+              <a:rPr lang="en-US" sz="1200" b="0" kern="1200" dirty="0" smtClean="0">
+                <a:solidFill>
+                  <a:schemeClr val="tx1"/>
+                </a:solidFill>
+                <a:latin typeface="+mn-lt"/>
+                <a:ea typeface="+mn-ea"/>
+                <a:cs typeface="+mn-cs"/>
+              </a:rPr>
+              <a:t> </a:t>
+            </a:r>
+            <a:r>
+              <a:rPr lang="en-US" sz="1200" b="0" kern="1200" dirty="0" err="1" smtClean="0">
+                <a:solidFill>
+                  <a:schemeClr val="tx1"/>
+                </a:solidFill>
+                <a:latin typeface="+mn-lt"/>
+                <a:ea typeface="+mn-ea"/>
+                <a:cs typeface="+mn-cs"/>
+              </a:rPr>
+              <a:t>af</a:t>
+            </a:r>
+            <a:r>
+              <a:rPr lang="en-US" sz="1200" b="0" kern="1200" dirty="0" smtClean="0">
+                <a:solidFill>
+                  <a:schemeClr val="tx1"/>
+                </a:solidFill>
+                <a:latin typeface="+mn-lt"/>
+                <a:ea typeface="+mn-ea"/>
+                <a:cs typeface="+mn-cs"/>
+              </a:rPr>
+              <a:t> </a:t>
+            </a:r>
+            <a:r>
+              <a:rPr lang="en-US" sz="1200" b="0" kern="1200" dirty="0" err="1" smtClean="0">
+                <a:solidFill>
+                  <a:schemeClr val="tx1"/>
+                </a:solidFill>
+                <a:latin typeface="+mn-lt"/>
+                <a:ea typeface="+mn-ea"/>
+                <a:cs typeface="+mn-cs"/>
+              </a:rPr>
+              <a:t>navne</a:t>
+            </a:r>
+            <a:r>
+              <a:rPr lang="en-US" sz="1200" b="0" kern="1200" dirty="0" smtClean="0">
+                <a:solidFill>
+                  <a:schemeClr val="tx1"/>
+                </a:solidFill>
+                <a:latin typeface="+mn-lt"/>
+                <a:ea typeface="+mn-ea"/>
+                <a:cs typeface="+mn-cs"/>
+              </a:rPr>
+              <a:t>.</a:t>
+            </a:r>
+          </a:p>
+          <a:p>
+            <a:pPr marL="171450" indent="-171450">
+              <a:buFontTx/>
+              <a:buChar char="-"/>
+            </a:pPr>
+            <a:r>
+              <a:rPr lang="en-US" sz="1200" b="0" kern="1200" dirty="0" smtClean="0">
+                <a:solidFill>
+                  <a:schemeClr val="tx1"/>
+                </a:solidFill>
+                <a:latin typeface="+mn-lt"/>
+                <a:ea typeface="+mn-ea"/>
+                <a:cs typeface="+mn-cs"/>
+              </a:rPr>
+              <a:t>For at </a:t>
+            </a:r>
+            <a:r>
+              <a:rPr lang="en-US" sz="1200" b="0" kern="1200" dirty="0" err="1" smtClean="0">
+                <a:solidFill>
+                  <a:schemeClr val="tx1"/>
+                </a:solidFill>
+                <a:latin typeface="+mn-lt"/>
+                <a:ea typeface="+mn-ea"/>
+                <a:cs typeface="+mn-cs"/>
+              </a:rPr>
+              <a:t>slå</a:t>
+            </a:r>
+            <a:r>
+              <a:rPr lang="en-US" sz="1200" b="0" kern="1200" dirty="0" smtClean="0">
+                <a:solidFill>
+                  <a:schemeClr val="tx1"/>
+                </a:solidFill>
+                <a:latin typeface="+mn-lt"/>
+                <a:ea typeface="+mn-ea"/>
+                <a:cs typeface="+mn-cs"/>
+              </a:rPr>
+              <a:t> </a:t>
+            </a:r>
+            <a:r>
+              <a:rPr lang="en-US" sz="1200" b="0" kern="1200" dirty="0" err="1" smtClean="0">
+                <a:solidFill>
+                  <a:schemeClr val="tx1"/>
+                </a:solidFill>
+                <a:latin typeface="+mn-lt"/>
+                <a:ea typeface="+mn-ea"/>
+                <a:cs typeface="+mn-cs"/>
+              </a:rPr>
+              <a:t>navne</a:t>
+            </a:r>
+            <a:r>
+              <a:rPr lang="en-US" sz="1200" b="0" kern="1200" dirty="0" smtClean="0">
+                <a:solidFill>
+                  <a:schemeClr val="tx1"/>
+                </a:solidFill>
+                <a:latin typeface="+mn-lt"/>
+                <a:ea typeface="+mn-ea"/>
+                <a:cs typeface="+mn-cs"/>
+              </a:rPr>
+              <a:t> op -&gt; "</a:t>
+            </a:r>
+            <a:r>
+              <a:rPr lang="en-US" sz="1200" b="0" kern="1200" smtClean="0">
+                <a:solidFill>
+                  <a:schemeClr val="tx1"/>
+                </a:solidFill>
+                <a:latin typeface="+mn-lt"/>
+                <a:ea typeface="+mn-ea"/>
+                <a:cs typeface="+mn-cs"/>
+              </a:rPr>
+              <a:t>Name resolution” </a:t>
+            </a:r>
+            <a:r>
+              <a:rPr lang="en-US" sz="1200" b="0" kern="1200" dirty="0" smtClean="0">
+                <a:solidFill>
+                  <a:schemeClr val="tx1"/>
+                </a:solidFill>
+                <a:latin typeface="+mn-lt"/>
+                <a:ea typeface="+mn-ea"/>
+                <a:cs typeface="+mn-cs"/>
+              </a:rPr>
+              <a:t>		</a:t>
+            </a:r>
+          </a:p>
+          <a:p>
+            <a:r>
+              <a:rPr lang="en-US" sz="1200" b="1" kern="1200" dirty="0" smtClean="0">
+                <a:solidFill>
+                  <a:schemeClr val="tx1"/>
+                </a:solidFill>
+                <a:latin typeface="+mn-lt"/>
+                <a:ea typeface="+mn-ea"/>
+                <a:cs typeface="+mn-cs"/>
+              </a:rPr>
+              <a:t>Attribute</a:t>
+            </a:r>
+            <a:endParaRPr lang="en-US" sz="1200" b="0" kern="1200" dirty="0" smtClean="0">
+              <a:solidFill>
+                <a:schemeClr val="tx1"/>
+              </a:solidFill>
+              <a:latin typeface="+mn-lt"/>
+              <a:ea typeface="+mn-ea"/>
+              <a:cs typeface="+mn-cs"/>
+            </a:endParaRPr>
+          </a:p>
+          <a:p>
+            <a:pPr marL="171450" indent="-171450">
+              <a:buFontTx/>
+              <a:buChar char="-"/>
+            </a:pPr>
+            <a:r>
+              <a:rPr lang="en-US" sz="1200" b="0" kern="1200" dirty="0" err="1" smtClean="0">
+                <a:solidFill>
+                  <a:schemeClr val="tx1"/>
+                </a:solidFill>
+                <a:latin typeface="+mn-lt"/>
+                <a:ea typeface="+mn-ea"/>
+                <a:cs typeface="+mn-cs"/>
+              </a:rPr>
+              <a:t>Enhed</a:t>
+            </a:r>
+            <a:r>
+              <a:rPr lang="en-US" sz="1200" b="0" kern="1200" dirty="0" smtClean="0">
+                <a:solidFill>
+                  <a:schemeClr val="tx1"/>
+                </a:solidFill>
+                <a:latin typeface="+mn-lt"/>
+                <a:ea typeface="+mn-ea"/>
+                <a:cs typeface="+mn-cs"/>
+              </a:rPr>
+              <a:t> </a:t>
+            </a:r>
+            <a:r>
+              <a:rPr lang="en-US" sz="1200" b="0" kern="1200" dirty="0" err="1" smtClean="0">
+                <a:solidFill>
+                  <a:schemeClr val="tx1"/>
+                </a:solidFill>
+                <a:latin typeface="+mn-lt"/>
+                <a:ea typeface="+mn-ea"/>
+                <a:cs typeface="+mn-cs"/>
+              </a:rPr>
+              <a:t>har</a:t>
+            </a:r>
+            <a:r>
+              <a:rPr lang="en-US" sz="1200" b="0" kern="1200" dirty="0" smtClean="0">
+                <a:solidFill>
+                  <a:schemeClr val="tx1"/>
+                </a:solidFill>
+                <a:latin typeface="+mn-lt"/>
+                <a:ea typeface="+mn-ea"/>
+                <a:cs typeface="+mn-cs"/>
+              </a:rPr>
+              <a:t> </a:t>
+            </a:r>
+            <a:r>
+              <a:rPr lang="en-US" sz="1200" b="0" kern="1200" dirty="0" err="1" smtClean="0">
+                <a:solidFill>
+                  <a:schemeClr val="tx1"/>
+                </a:solidFill>
+                <a:latin typeface="+mn-lt"/>
+                <a:ea typeface="+mn-ea"/>
+                <a:cs typeface="+mn-cs"/>
+              </a:rPr>
+              <a:t>flere</a:t>
+            </a:r>
+            <a:r>
+              <a:rPr lang="en-US" sz="1200" b="0" kern="1200" dirty="0" smtClean="0">
+                <a:solidFill>
+                  <a:schemeClr val="tx1"/>
+                </a:solidFill>
+                <a:latin typeface="+mn-lt"/>
+                <a:ea typeface="+mn-ea"/>
+                <a:cs typeface="+mn-cs"/>
+              </a:rPr>
+              <a:t> </a:t>
+            </a:r>
+            <a:r>
+              <a:rPr lang="en-US" sz="1200" b="0" kern="1200" dirty="0" err="1" smtClean="0">
+                <a:solidFill>
+                  <a:schemeClr val="tx1"/>
+                </a:solidFill>
+                <a:latin typeface="+mn-lt"/>
+                <a:ea typeface="+mn-ea"/>
+                <a:cs typeface="+mn-cs"/>
+              </a:rPr>
+              <a:t>attributter</a:t>
+            </a:r>
+            <a:r>
+              <a:rPr lang="en-US" sz="1200" b="0" kern="1200" dirty="0" smtClean="0">
+                <a:solidFill>
+                  <a:schemeClr val="tx1"/>
+                </a:solidFill>
+                <a:latin typeface="+mn-lt"/>
+                <a:ea typeface="+mn-ea"/>
+                <a:cs typeface="+mn-cs"/>
+              </a:rPr>
+              <a:t> (information)</a:t>
+            </a:r>
+          </a:p>
+          <a:p>
+            <a:pPr marL="171450" indent="-171450">
+              <a:buFontTx/>
+              <a:buChar char="-"/>
+            </a:pPr>
+            <a:r>
+              <a:rPr lang="en-US" sz="1200" b="1" kern="1200" dirty="0" err="1" smtClean="0">
+                <a:solidFill>
+                  <a:schemeClr val="tx1"/>
+                </a:solidFill>
+                <a:latin typeface="+mn-lt"/>
+                <a:ea typeface="+mn-ea"/>
+                <a:cs typeface="+mn-cs"/>
+              </a:rPr>
+              <a:t>Beskrive</a:t>
+            </a:r>
+            <a:r>
+              <a:rPr lang="en-US" sz="1200" b="1" kern="1200" dirty="0" smtClean="0">
+                <a:solidFill>
+                  <a:schemeClr val="tx1"/>
+                </a:solidFill>
+                <a:latin typeface="+mn-lt"/>
+                <a:ea typeface="+mn-ea"/>
+                <a:cs typeface="+mn-cs"/>
+              </a:rPr>
+              <a:t> </a:t>
+            </a:r>
+            <a:r>
+              <a:rPr lang="en-US" sz="1200" b="1" kern="1200" dirty="0" err="1" smtClean="0">
+                <a:solidFill>
+                  <a:schemeClr val="tx1"/>
+                </a:solidFill>
+                <a:latin typeface="+mn-lt"/>
+                <a:ea typeface="+mn-ea"/>
+                <a:cs typeface="+mn-cs"/>
+              </a:rPr>
+              <a:t>hvordan</a:t>
+            </a:r>
+            <a:r>
+              <a:rPr lang="en-US" sz="1200" b="1" kern="1200" dirty="0" smtClean="0">
+                <a:solidFill>
+                  <a:schemeClr val="tx1"/>
+                </a:solidFill>
+                <a:latin typeface="+mn-lt"/>
+                <a:ea typeface="+mn-ea"/>
+                <a:cs typeface="+mn-cs"/>
+              </a:rPr>
+              <a:t> en </a:t>
+            </a:r>
+            <a:r>
+              <a:rPr lang="en-US" sz="1200" b="1" kern="1200" dirty="0" err="1" smtClean="0">
+                <a:solidFill>
+                  <a:schemeClr val="tx1"/>
+                </a:solidFill>
+                <a:latin typeface="+mn-lt"/>
+                <a:ea typeface="+mn-ea"/>
+                <a:cs typeface="+mn-cs"/>
+              </a:rPr>
+              <a:t>enhed</a:t>
+            </a:r>
+            <a:r>
+              <a:rPr lang="en-US" sz="1200" b="1" kern="1200" dirty="0" smtClean="0">
+                <a:solidFill>
+                  <a:schemeClr val="tx1"/>
+                </a:solidFill>
+                <a:latin typeface="+mn-lt"/>
+                <a:ea typeface="+mn-ea"/>
+                <a:cs typeface="+mn-cs"/>
+              </a:rPr>
+              <a:t> </a:t>
+            </a:r>
+            <a:r>
+              <a:rPr lang="en-US" sz="1200" b="1" kern="1200" dirty="0" err="1" smtClean="0">
+                <a:solidFill>
+                  <a:schemeClr val="tx1"/>
+                </a:solidFill>
+                <a:latin typeface="+mn-lt"/>
+                <a:ea typeface="+mn-ea"/>
+                <a:cs typeface="+mn-cs"/>
+              </a:rPr>
+              <a:t>kan</a:t>
+            </a:r>
+            <a:r>
+              <a:rPr lang="en-US" sz="1200" b="1" kern="1200" dirty="0" smtClean="0">
+                <a:solidFill>
+                  <a:schemeClr val="tx1"/>
+                </a:solidFill>
+                <a:latin typeface="+mn-lt"/>
+                <a:ea typeface="+mn-ea"/>
+                <a:cs typeface="+mn-cs"/>
+              </a:rPr>
+              <a:t> </a:t>
+            </a:r>
+            <a:r>
+              <a:rPr lang="en-US" sz="1200" b="1" kern="1200" dirty="0" err="1" smtClean="0">
+                <a:solidFill>
+                  <a:schemeClr val="tx1"/>
+                </a:solidFill>
+                <a:latin typeface="+mn-lt"/>
+                <a:ea typeface="+mn-ea"/>
+                <a:cs typeface="+mn-cs"/>
+              </a:rPr>
+              <a:t>tilgåes</a:t>
+            </a:r>
+            <a:r>
+              <a:rPr lang="en-US" sz="1200" b="1" kern="1200" dirty="0" smtClean="0">
+                <a:solidFill>
+                  <a:schemeClr val="tx1"/>
+                </a:solidFill>
+                <a:latin typeface="+mn-lt"/>
+                <a:ea typeface="+mn-ea"/>
+                <a:cs typeface="+mn-cs"/>
+              </a:rPr>
+              <a:t> </a:t>
+            </a:r>
+            <a:r>
+              <a:rPr lang="en-US" sz="1200" b="1" kern="1200" dirty="0" err="1" smtClean="0">
+                <a:solidFill>
+                  <a:schemeClr val="tx1"/>
+                </a:solidFill>
+                <a:latin typeface="+mn-lt"/>
+                <a:ea typeface="+mn-ea"/>
+                <a:cs typeface="+mn-cs"/>
+              </a:rPr>
+              <a:t>gennem</a:t>
+            </a:r>
+            <a:r>
+              <a:rPr lang="en-US" sz="1200" b="1" kern="1200" dirty="0" smtClean="0">
+                <a:solidFill>
+                  <a:schemeClr val="tx1"/>
+                </a:solidFill>
+                <a:latin typeface="+mn-lt"/>
+                <a:ea typeface="+mn-ea"/>
+                <a:cs typeface="+mn-cs"/>
+              </a:rPr>
+              <a:t> </a:t>
+            </a:r>
+            <a:r>
+              <a:rPr lang="en-US" sz="1200" b="1" kern="1200" dirty="0" err="1" smtClean="0">
+                <a:solidFill>
+                  <a:schemeClr val="tx1"/>
+                </a:solidFill>
+                <a:latin typeface="+mn-lt"/>
+                <a:ea typeface="+mn-ea"/>
+                <a:cs typeface="+mn-cs"/>
+              </a:rPr>
+              <a:t>forskellige</a:t>
+            </a:r>
+            <a:r>
+              <a:rPr lang="en-US" sz="1200" b="1" kern="1200" dirty="0" smtClean="0">
+                <a:solidFill>
+                  <a:schemeClr val="tx1"/>
+                </a:solidFill>
+                <a:latin typeface="+mn-lt"/>
+                <a:ea typeface="+mn-ea"/>
+                <a:cs typeface="+mn-cs"/>
+              </a:rPr>
+              <a:t> </a:t>
+            </a:r>
+            <a:r>
+              <a:rPr lang="en-US" sz="1200" b="1" kern="1200" dirty="0" err="1" smtClean="0">
+                <a:solidFill>
+                  <a:schemeClr val="tx1"/>
+                </a:solidFill>
+                <a:latin typeface="+mn-lt"/>
+                <a:ea typeface="+mn-ea"/>
+                <a:cs typeface="+mn-cs"/>
+              </a:rPr>
+              <a:t>attributter</a:t>
+            </a:r>
+            <a:r>
+              <a:rPr lang="en-US" sz="1200" b="1" kern="1200" dirty="0" smtClean="0">
+                <a:solidFill>
+                  <a:schemeClr val="tx1"/>
+                </a:solidFill>
+                <a:latin typeface="+mn-lt"/>
+                <a:ea typeface="+mn-ea"/>
+                <a:cs typeface="+mn-cs"/>
+              </a:rPr>
+              <a:t>. </a:t>
+            </a:r>
+          </a:p>
+          <a:p>
+            <a:pPr marL="171450" indent="-171450">
+              <a:buFontTx/>
+              <a:buChar char="-"/>
+            </a:pPr>
+            <a:r>
+              <a:rPr lang="en-US" sz="1200" b="0" kern="1200" dirty="0" err="1" smtClean="0">
+                <a:solidFill>
+                  <a:schemeClr val="tx1"/>
+                </a:solidFill>
+                <a:latin typeface="+mn-lt"/>
+                <a:ea typeface="+mn-ea"/>
+                <a:cs typeface="+mn-cs"/>
+              </a:rPr>
+              <a:t>Gør</a:t>
+            </a:r>
+            <a:r>
+              <a:rPr lang="en-US" sz="1200" b="0" kern="1200" dirty="0" smtClean="0">
+                <a:solidFill>
+                  <a:schemeClr val="tx1"/>
+                </a:solidFill>
+                <a:latin typeface="+mn-lt"/>
+                <a:ea typeface="+mn-ea"/>
+                <a:cs typeface="+mn-cs"/>
+              </a:rPr>
+              <a:t> en </a:t>
+            </a:r>
+            <a:r>
+              <a:rPr lang="en-US" sz="1200" b="0" kern="1200" dirty="0" err="1" smtClean="0">
+                <a:solidFill>
+                  <a:schemeClr val="tx1"/>
+                </a:solidFill>
+                <a:latin typeface="+mn-lt"/>
+                <a:ea typeface="+mn-ea"/>
+                <a:cs typeface="+mn-cs"/>
+              </a:rPr>
+              <a:t>bruger</a:t>
+            </a:r>
+            <a:r>
+              <a:rPr lang="en-US" sz="1200" b="0" kern="1200" dirty="0" smtClean="0">
+                <a:solidFill>
+                  <a:schemeClr val="tx1"/>
+                </a:solidFill>
+                <a:latin typeface="+mn-lt"/>
+                <a:ea typeface="+mn-ea"/>
+                <a:cs typeface="+mn-cs"/>
+              </a:rPr>
+              <a:t> </a:t>
+            </a:r>
+            <a:r>
+              <a:rPr lang="en-US" sz="1200" b="0" kern="1200" dirty="0" err="1" smtClean="0">
+                <a:solidFill>
+                  <a:schemeClr val="tx1"/>
+                </a:solidFill>
+                <a:latin typeface="+mn-lt"/>
+                <a:ea typeface="+mn-ea"/>
+                <a:cs typeface="+mn-cs"/>
+              </a:rPr>
+              <a:t>kan</a:t>
+            </a:r>
+            <a:r>
+              <a:rPr lang="en-US" sz="1200" b="0" kern="1200" dirty="0" smtClean="0">
+                <a:solidFill>
+                  <a:schemeClr val="tx1"/>
+                </a:solidFill>
+                <a:latin typeface="+mn-lt"/>
+                <a:ea typeface="+mn-ea"/>
+                <a:cs typeface="+mn-cs"/>
+              </a:rPr>
+              <a:t> </a:t>
+            </a:r>
+            <a:r>
+              <a:rPr lang="en-US" sz="1200" b="0" kern="1200" dirty="0" err="1" smtClean="0">
+                <a:solidFill>
+                  <a:schemeClr val="tx1"/>
+                </a:solidFill>
+                <a:latin typeface="+mn-lt"/>
+                <a:ea typeface="+mn-ea"/>
+                <a:cs typeface="+mn-cs"/>
+              </a:rPr>
+              <a:t>søge</a:t>
+            </a:r>
+            <a:r>
+              <a:rPr lang="en-US" sz="1200" b="0" kern="1200" dirty="0" smtClean="0">
+                <a:solidFill>
+                  <a:schemeClr val="tx1"/>
+                </a:solidFill>
+                <a:latin typeface="+mn-lt"/>
+                <a:ea typeface="+mn-ea"/>
+                <a:cs typeface="+mn-cs"/>
+              </a:rPr>
+              <a:t> </a:t>
+            </a:r>
+            <a:r>
+              <a:rPr lang="en-US" sz="1200" b="0" kern="1200" dirty="0" err="1" smtClean="0">
+                <a:solidFill>
+                  <a:schemeClr val="tx1"/>
+                </a:solidFill>
+                <a:latin typeface="+mn-lt"/>
+                <a:ea typeface="+mn-ea"/>
+                <a:cs typeface="+mn-cs"/>
+              </a:rPr>
+              <a:t>på</a:t>
+            </a:r>
+            <a:r>
+              <a:rPr lang="en-US" sz="1200" b="0" kern="1200" dirty="0" smtClean="0">
+                <a:solidFill>
+                  <a:schemeClr val="tx1"/>
+                </a:solidFill>
+                <a:latin typeface="+mn-lt"/>
+                <a:ea typeface="+mn-ea"/>
+                <a:cs typeface="+mn-cs"/>
+              </a:rPr>
+              <a:t> en </a:t>
+            </a:r>
+            <a:r>
+              <a:rPr lang="en-US" sz="1200" b="0" kern="1200" dirty="0" err="1" smtClean="0">
+                <a:solidFill>
+                  <a:schemeClr val="tx1"/>
+                </a:solidFill>
+                <a:latin typeface="+mn-lt"/>
+                <a:ea typeface="+mn-ea"/>
+                <a:cs typeface="+mn-cs"/>
+              </a:rPr>
+              <a:t>enhed</a:t>
+            </a:r>
+            <a:r>
+              <a:rPr lang="en-US" sz="1200" b="0" kern="1200" dirty="0" smtClean="0">
+                <a:solidFill>
+                  <a:schemeClr val="tx1"/>
+                </a:solidFill>
+                <a:latin typeface="+mn-lt"/>
+                <a:ea typeface="+mn-ea"/>
+                <a:cs typeface="+mn-cs"/>
+              </a:rPr>
+              <a:t> </a:t>
+            </a:r>
+            <a:r>
+              <a:rPr lang="en-US" sz="1200" b="0" kern="1200" dirty="0" err="1" smtClean="0">
+                <a:solidFill>
+                  <a:schemeClr val="tx1"/>
+                </a:solidFill>
+                <a:latin typeface="+mn-lt"/>
+                <a:ea typeface="+mn-ea"/>
+                <a:cs typeface="+mn-cs"/>
+              </a:rPr>
+              <a:t>som</a:t>
+            </a:r>
+            <a:r>
+              <a:rPr lang="en-US" sz="1200" b="0" kern="1200" dirty="0" smtClean="0">
+                <a:solidFill>
+                  <a:schemeClr val="tx1"/>
+                </a:solidFill>
+                <a:latin typeface="+mn-lt"/>
+                <a:ea typeface="+mn-ea"/>
+                <a:cs typeface="+mn-cs"/>
+              </a:rPr>
+              <a:t> </a:t>
+            </a:r>
+            <a:r>
+              <a:rPr lang="en-US" sz="1200" b="0" kern="1200" dirty="0" err="1" smtClean="0">
+                <a:solidFill>
+                  <a:schemeClr val="tx1"/>
+                </a:solidFill>
+                <a:latin typeface="+mn-lt"/>
+                <a:ea typeface="+mn-ea"/>
+                <a:cs typeface="+mn-cs"/>
+              </a:rPr>
+              <a:t>ikke</a:t>
+            </a:r>
+            <a:r>
+              <a:rPr lang="en-US" sz="1200" b="0" kern="1200" dirty="0" smtClean="0">
+                <a:solidFill>
+                  <a:schemeClr val="tx1"/>
+                </a:solidFill>
+                <a:latin typeface="+mn-lt"/>
+                <a:ea typeface="+mn-ea"/>
+                <a:cs typeface="+mn-cs"/>
+              </a:rPr>
+              <a:t> </a:t>
+            </a:r>
+            <a:r>
+              <a:rPr lang="en-US" sz="1200" b="0" kern="1200" dirty="0" err="1" smtClean="0">
+                <a:solidFill>
+                  <a:schemeClr val="tx1"/>
+                </a:solidFill>
+                <a:latin typeface="+mn-lt"/>
+                <a:ea typeface="+mn-ea"/>
+                <a:cs typeface="+mn-cs"/>
+              </a:rPr>
+              <a:t>er</a:t>
+            </a:r>
+            <a:r>
+              <a:rPr lang="en-US" sz="1200" b="0" kern="1200" dirty="0" smtClean="0">
+                <a:solidFill>
+                  <a:schemeClr val="tx1"/>
+                </a:solidFill>
+                <a:latin typeface="+mn-lt"/>
+                <a:ea typeface="+mn-ea"/>
+                <a:cs typeface="+mn-cs"/>
+              </a:rPr>
+              <a:t> </a:t>
+            </a:r>
+            <a:r>
+              <a:rPr lang="en-US" sz="1200" b="0" kern="1200" dirty="0" err="1" smtClean="0">
+                <a:solidFill>
+                  <a:schemeClr val="tx1"/>
+                </a:solidFill>
+                <a:latin typeface="+mn-lt"/>
+                <a:ea typeface="+mn-ea"/>
+                <a:cs typeface="+mn-cs"/>
+              </a:rPr>
+              <a:t>kendt</a:t>
+            </a:r>
+            <a:endParaRPr lang="en-US" sz="1200" b="0" kern="1200" dirty="0" smtClean="0">
+              <a:solidFill>
+                <a:schemeClr val="tx1"/>
+              </a:solidFill>
+              <a:latin typeface="+mn-lt"/>
+              <a:ea typeface="+mn-ea"/>
+              <a:cs typeface="+mn-cs"/>
+            </a:endParaRPr>
+          </a:p>
+          <a:p>
+            <a:pPr marL="171450" indent="-171450">
+              <a:buFontTx/>
+              <a:buChar char="-"/>
+            </a:pPr>
+            <a:r>
+              <a:rPr lang="en-US" sz="1200" b="0" kern="1200" dirty="0" err="1" smtClean="0">
+                <a:solidFill>
+                  <a:schemeClr val="tx1"/>
+                </a:solidFill>
+                <a:latin typeface="+mn-lt"/>
+                <a:ea typeface="+mn-ea"/>
+                <a:cs typeface="+mn-cs"/>
+              </a:rPr>
+              <a:t>Eks</a:t>
+            </a:r>
+            <a:r>
+              <a:rPr lang="en-US" sz="1200" b="0" kern="1200" baseline="0" dirty="0" smtClean="0">
+                <a:solidFill>
+                  <a:schemeClr val="tx1"/>
+                </a:solidFill>
+                <a:latin typeface="+mn-lt"/>
+                <a:ea typeface="+mn-ea"/>
+                <a:cs typeface="+mn-cs"/>
+              </a:rPr>
+              <a:t> (</a:t>
+            </a:r>
+            <a:r>
+              <a:rPr lang="en-US" sz="1200" b="0" kern="1200" baseline="0" dirty="0" err="1" smtClean="0">
+                <a:solidFill>
+                  <a:schemeClr val="tx1"/>
+                </a:solidFill>
+                <a:latin typeface="+mn-lt"/>
+                <a:ea typeface="+mn-ea"/>
+                <a:cs typeface="+mn-cs"/>
+              </a:rPr>
+              <a:t>fandt</a:t>
+            </a:r>
+            <a:r>
+              <a:rPr lang="en-US" sz="1200" b="0" kern="1200" baseline="0" dirty="0" smtClean="0">
+                <a:solidFill>
+                  <a:schemeClr val="tx1"/>
+                </a:solidFill>
+                <a:latin typeface="+mn-lt"/>
+                <a:ea typeface="+mn-ea"/>
+                <a:cs typeface="+mn-cs"/>
+              </a:rPr>
+              <a:t> et </a:t>
+            </a:r>
+            <a:r>
+              <a:rPr lang="en-US" sz="1200" b="0" kern="1200" baseline="0" dirty="0" err="1" smtClean="0">
+                <a:solidFill>
+                  <a:schemeClr val="tx1"/>
+                </a:solidFill>
+                <a:latin typeface="+mn-lt"/>
+                <a:ea typeface="+mn-ea"/>
+                <a:cs typeface="+mn-cs"/>
+              </a:rPr>
+              <a:t>på</a:t>
+            </a:r>
+            <a:r>
+              <a:rPr lang="en-US" sz="1200" b="0" kern="1200" baseline="0" dirty="0" smtClean="0">
+                <a:solidFill>
+                  <a:schemeClr val="tx1"/>
+                </a:solidFill>
+                <a:latin typeface="+mn-lt"/>
+                <a:ea typeface="+mn-ea"/>
+                <a:cs typeface="+mn-cs"/>
+              </a:rPr>
+              <a:t> </a:t>
+            </a:r>
+            <a:r>
+              <a:rPr lang="en-US" sz="1200" b="0" kern="1200" baseline="0" dirty="0" err="1" smtClean="0">
+                <a:solidFill>
+                  <a:schemeClr val="tx1"/>
+                </a:solidFill>
+                <a:latin typeface="+mn-lt"/>
+                <a:ea typeface="+mn-ea"/>
+                <a:cs typeface="+mn-cs"/>
+              </a:rPr>
+              <a:t>nettet</a:t>
+            </a:r>
+            <a:r>
+              <a:rPr lang="en-US" sz="1200" b="0" kern="1200" baseline="0" dirty="0" smtClean="0">
+                <a:solidFill>
+                  <a:schemeClr val="tx1"/>
+                </a:solidFill>
+                <a:latin typeface="+mn-lt"/>
+                <a:ea typeface="+mn-ea"/>
+                <a:cs typeface="+mn-cs"/>
+              </a:rPr>
+              <a:t>) </a:t>
+            </a:r>
+            <a:r>
+              <a:rPr lang="en-US" sz="1200" b="0" kern="1200" baseline="0" dirty="0" err="1" smtClean="0">
+                <a:solidFill>
+                  <a:schemeClr val="tx1"/>
+                </a:solidFill>
+                <a:latin typeface="+mn-lt"/>
+                <a:ea typeface="+mn-ea"/>
+                <a:cs typeface="+mn-cs"/>
+              </a:rPr>
+              <a:t>er</a:t>
+            </a:r>
+            <a:r>
+              <a:rPr lang="en-US" sz="1200" b="0" kern="1200" baseline="0" dirty="0" smtClean="0">
+                <a:solidFill>
+                  <a:schemeClr val="tx1"/>
+                </a:solidFill>
+                <a:latin typeface="+mn-lt"/>
+                <a:ea typeface="+mn-ea"/>
+                <a:cs typeface="+mn-cs"/>
+              </a:rPr>
+              <a:t> at man </a:t>
+            </a:r>
+            <a:r>
+              <a:rPr lang="en-US" sz="1200" b="0" kern="1200" baseline="0" dirty="0" err="1" smtClean="0">
+                <a:solidFill>
+                  <a:schemeClr val="tx1"/>
+                </a:solidFill>
+                <a:latin typeface="+mn-lt"/>
+                <a:ea typeface="+mn-ea"/>
+                <a:cs typeface="+mn-cs"/>
+              </a:rPr>
+              <a:t>har</a:t>
+            </a:r>
+            <a:r>
+              <a:rPr lang="en-US" sz="1200" b="0" kern="1200" baseline="0" dirty="0" smtClean="0">
+                <a:solidFill>
+                  <a:schemeClr val="tx1"/>
+                </a:solidFill>
+                <a:latin typeface="+mn-lt"/>
+                <a:ea typeface="+mn-ea"/>
+                <a:cs typeface="+mn-cs"/>
+              </a:rPr>
+              <a:t> en </a:t>
+            </a:r>
+            <a:r>
+              <a:rPr lang="en-US" sz="1200" b="0" kern="1200" baseline="0" dirty="0" err="1" smtClean="0">
+                <a:solidFill>
+                  <a:schemeClr val="tx1"/>
+                </a:solidFill>
+                <a:latin typeface="+mn-lt"/>
+                <a:ea typeface="+mn-ea"/>
+                <a:cs typeface="+mn-cs"/>
+              </a:rPr>
+              <a:t>musik</a:t>
+            </a:r>
+            <a:r>
+              <a:rPr lang="en-US" sz="1200" b="0" kern="1200" baseline="0" dirty="0" smtClean="0">
+                <a:solidFill>
+                  <a:schemeClr val="tx1"/>
+                </a:solidFill>
+                <a:latin typeface="+mn-lt"/>
+                <a:ea typeface="+mn-ea"/>
+                <a:cs typeface="+mn-cs"/>
+              </a:rPr>
+              <a:t> DB </a:t>
+            </a:r>
+            <a:r>
+              <a:rPr lang="en-US" sz="1200" b="0" kern="1200" baseline="0" dirty="0" err="1" smtClean="0">
+                <a:solidFill>
+                  <a:schemeClr val="tx1"/>
+                </a:solidFill>
+                <a:latin typeface="+mn-lt"/>
+                <a:ea typeface="+mn-ea"/>
+                <a:cs typeface="+mn-cs"/>
+              </a:rPr>
+              <a:t>hvor</a:t>
+            </a:r>
+            <a:r>
+              <a:rPr lang="en-US" sz="1200" b="0" kern="1200" baseline="0" dirty="0" smtClean="0">
+                <a:solidFill>
+                  <a:schemeClr val="tx1"/>
+                </a:solidFill>
+                <a:latin typeface="+mn-lt"/>
+                <a:ea typeface="+mn-ea"/>
+                <a:cs typeface="+mn-cs"/>
+              </a:rPr>
+              <a:t> et </a:t>
+            </a:r>
+            <a:r>
+              <a:rPr lang="en-US" sz="1200" b="0" kern="1200" baseline="0" dirty="0" err="1" smtClean="0">
+                <a:solidFill>
+                  <a:schemeClr val="tx1"/>
+                </a:solidFill>
+                <a:latin typeface="+mn-lt"/>
+                <a:ea typeface="+mn-ea"/>
+                <a:cs typeface="+mn-cs"/>
+              </a:rPr>
+              <a:t>givent</a:t>
+            </a:r>
+            <a:r>
+              <a:rPr lang="en-US" sz="1200" b="0" kern="1200" baseline="0" dirty="0" smtClean="0">
+                <a:solidFill>
+                  <a:schemeClr val="tx1"/>
+                </a:solidFill>
+                <a:latin typeface="+mn-lt"/>
+                <a:ea typeface="+mn-ea"/>
+                <a:cs typeface="+mn-cs"/>
+              </a:rPr>
+              <a:t> </a:t>
+            </a:r>
+            <a:r>
+              <a:rPr lang="en-US" sz="1200" b="0" kern="1200" baseline="0" dirty="0" err="1" smtClean="0">
+                <a:solidFill>
+                  <a:schemeClr val="tx1"/>
+                </a:solidFill>
+                <a:latin typeface="+mn-lt"/>
+                <a:ea typeface="+mn-ea"/>
+                <a:cs typeface="+mn-cs"/>
+              </a:rPr>
+              <a:t>nummer</a:t>
+            </a:r>
+            <a:r>
+              <a:rPr lang="en-US" sz="1200" b="0" kern="1200" baseline="0" dirty="0" smtClean="0">
+                <a:solidFill>
+                  <a:schemeClr val="tx1"/>
+                </a:solidFill>
+                <a:latin typeface="+mn-lt"/>
+                <a:ea typeface="+mn-ea"/>
+                <a:cs typeface="+mn-cs"/>
+              </a:rPr>
+              <a:t> </a:t>
+            </a:r>
+            <a:r>
+              <a:rPr lang="en-US" sz="1200" b="0" kern="1200" baseline="0" dirty="0" err="1" smtClean="0">
+                <a:solidFill>
+                  <a:schemeClr val="tx1"/>
+                </a:solidFill>
+                <a:latin typeface="+mn-lt"/>
+                <a:ea typeface="+mn-ea"/>
+                <a:cs typeface="+mn-cs"/>
+              </a:rPr>
+              <a:t>kan</a:t>
+            </a:r>
+            <a:r>
+              <a:rPr lang="en-US" sz="1200" b="0" kern="1200" baseline="0" dirty="0" smtClean="0">
+                <a:solidFill>
+                  <a:schemeClr val="tx1"/>
+                </a:solidFill>
+                <a:latin typeface="+mn-lt"/>
+                <a:ea typeface="+mn-ea"/>
+                <a:cs typeface="+mn-cs"/>
+              </a:rPr>
+              <a:t> </a:t>
+            </a:r>
+            <a:r>
+              <a:rPr lang="en-US" sz="1200" b="0" kern="1200" baseline="0" dirty="0" err="1" smtClean="0">
+                <a:solidFill>
+                  <a:schemeClr val="tx1"/>
+                </a:solidFill>
+                <a:latin typeface="+mn-lt"/>
+                <a:ea typeface="+mn-ea"/>
+                <a:cs typeface="+mn-cs"/>
+              </a:rPr>
+              <a:t>ligge</a:t>
+            </a:r>
+            <a:r>
+              <a:rPr lang="en-US" sz="1200" b="0" kern="1200" baseline="0" dirty="0" smtClean="0">
+                <a:solidFill>
+                  <a:schemeClr val="tx1"/>
+                </a:solidFill>
+                <a:latin typeface="+mn-lt"/>
+                <a:ea typeface="+mn-ea"/>
+                <a:cs typeface="+mn-cs"/>
+              </a:rPr>
+              <a:t> </a:t>
+            </a:r>
+            <a:r>
+              <a:rPr lang="en-US" sz="1200" b="0" kern="1200" baseline="0" dirty="0" err="1" smtClean="0">
+                <a:solidFill>
+                  <a:schemeClr val="tx1"/>
+                </a:solidFill>
+                <a:latin typeface="+mn-lt"/>
+                <a:ea typeface="+mn-ea"/>
+                <a:cs typeface="+mn-cs"/>
+              </a:rPr>
+              <a:t>inden</a:t>
+            </a:r>
+            <a:r>
+              <a:rPr lang="en-US" sz="1200" b="0" kern="1200" baseline="0" dirty="0" smtClean="0">
+                <a:solidFill>
+                  <a:schemeClr val="tx1"/>
+                </a:solidFill>
+                <a:latin typeface="+mn-lt"/>
+                <a:ea typeface="+mn-ea"/>
+                <a:cs typeface="+mn-cs"/>
+              </a:rPr>
+              <a:t> for </a:t>
+            </a:r>
+            <a:r>
+              <a:rPr lang="en-US" sz="1200" b="0" kern="1200" baseline="0" dirty="0" err="1" smtClean="0">
+                <a:solidFill>
+                  <a:schemeClr val="tx1"/>
+                </a:solidFill>
+                <a:latin typeface="+mn-lt"/>
+                <a:ea typeface="+mn-ea"/>
+                <a:cs typeface="+mn-cs"/>
+              </a:rPr>
+              <a:t>flere</a:t>
+            </a:r>
+            <a:r>
+              <a:rPr lang="en-US" sz="1200" b="0" kern="1200" baseline="0" dirty="0" smtClean="0">
+                <a:solidFill>
+                  <a:schemeClr val="tx1"/>
+                </a:solidFill>
+                <a:latin typeface="+mn-lt"/>
+                <a:ea typeface="+mn-ea"/>
+                <a:cs typeface="+mn-cs"/>
+              </a:rPr>
+              <a:t> </a:t>
+            </a:r>
+            <a:r>
+              <a:rPr lang="en-US" sz="1200" b="0" kern="1200" baseline="0" dirty="0" err="1" smtClean="0">
+                <a:solidFill>
+                  <a:schemeClr val="tx1"/>
+                </a:solidFill>
+                <a:latin typeface="+mn-lt"/>
+                <a:ea typeface="+mn-ea"/>
+                <a:cs typeface="+mn-cs"/>
+              </a:rPr>
+              <a:t>kategorier</a:t>
+            </a:r>
+            <a:r>
+              <a:rPr lang="en-US" sz="1200" b="0" kern="1200" baseline="0" dirty="0" smtClean="0">
+                <a:solidFill>
+                  <a:schemeClr val="tx1"/>
+                </a:solidFill>
+                <a:latin typeface="+mn-lt"/>
+                <a:ea typeface="+mn-ea"/>
+                <a:cs typeface="+mn-cs"/>
+              </a:rPr>
+              <a:t> (</a:t>
+            </a:r>
+            <a:r>
+              <a:rPr lang="en-US" sz="1200" b="0" kern="1200" baseline="0" dirty="0" err="1" smtClean="0">
+                <a:solidFill>
+                  <a:schemeClr val="tx1"/>
+                </a:solidFill>
+                <a:latin typeface="+mn-lt"/>
+                <a:ea typeface="+mn-ea"/>
+                <a:cs typeface="+mn-cs"/>
+              </a:rPr>
+              <a:t>fx</a:t>
+            </a:r>
+            <a:r>
+              <a:rPr lang="en-US" sz="1200" b="0" kern="1200" baseline="0" dirty="0" smtClean="0">
+                <a:solidFill>
+                  <a:schemeClr val="tx1"/>
+                </a:solidFill>
+                <a:latin typeface="+mn-lt"/>
+                <a:ea typeface="+mn-ea"/>
+                <a:cs typeface="+mn-cs"/>
+              </a:rPr>
+              <a:t> pop </a:t>
+            </a:r>
+            <a:r>
+              <a:rPr lang="en-US" sz="1200" b="0" kern="1200" baseline="0" dirty="0" err="1" smtClean="0">
+                <a:solidFill>
+                  <a:schemeClr val="tx1"/>
+                </a:solidFill>
+                <a:latin typeface="+mn-lt"/>
+                <a:ea typeface="+mn-ea"/>
+                <a:cs typeface="+mn-cs"/>
+              </a:rPr>
+              <a:t>og</a:t>
+            </a:r>
+            <a:r>
+              <a:rPr lang="en-US" sz="1200" b="0" kern="1200" baseline="0" dirty="0" smtClean="0">
+                <a:solidFill>
+                  <a:schemeClr val="tx1"/>
+                </a:solidFill>
+                <a:latin typeface="+mn-lt"/>
+                <a:ea typeface="+mn-ea"/>
+                <a:cs typeface="+mn-cs"/>
+              </a:rPr>
+              <a:t> Rock </a:t>
+            </a:r>
+            <a:r>
+              <a:rPr lang="en-US" sz="1200" b="0" kern="1200" baseline="0" dirty="0" err="1" smtClean="0">
+                <a:solidFill>
+                  <a:schemeClr val="tx1"/>
+                </a:solidFill>
+                <a:latin typeface="+mn-lt"/>
+                <a:ea typeface="+mn-ea"/>
+                <a:cs typeface="+mn-cs"/>
+              </a:rPr>
+              <a:t>som</a:t>
+            </a:r>
+            <a:r>
+              <a:rPr lang="en-US" sz="1200" b="0" kern="1200" baseline="0" dirty="0" smtClean="0">
+                <a:solidFill>
+                  <a:schemeClr val="tx1"/>
+                </a:solidFill>
+                <a:latin typeface="+mn-lt"/>
+                <a:ea typeface="+mn-ea"/>
+                <a:cs typeface="+mn-cs"/>
+              </a:rPr>
+              <a:t> </a:t>
+            </a:r>
+            <a:r>
+              <a:rPr lang="en-US" sz="1200" b="0" kern="1200" baseline="0" dirty="0" err="1" smtClean="0">
+                <a:solidFill>
+                  <a:schemeClr val="tx1"/>
+                </a:solidFill>
+                <a:latin typeface="+mn-lt"/>
+                <a:ea typeface="+mn-ea"/>
+                <a:cs typeface="+mn-cs"/>
+              </a:rPr>
+              <a:t>er</a:t>
+            </a:r>
+            <a:r>
+              <a:rPr lang="en-US" sz="1200" b="0" kern="1200" baseline="0" dirty="0" smtClean="0">
+                <a:solidFill>
+                  <a:schemeClr val="tx1"/>
+                </a:solidFill>
+                <a:latin typeface="+mn-lt"/>
+                <a:ea typeface="+mn-ea"/>
+                <a:cs typeface="+mn-cs"/>
+              </a:rPr>
+              <a:t> </a:t>
+            </a:r>
+            <a:r>
+              <a:rPr lang="en-US" sz="1200" b="0" kern="1200" baseline="0" dirty="0" err="1" smtClean="0">
+                <a:solidFill>
+                  <a:schemeClr val="tx1"/>
+                </a:solidFill>
+                <a:latin typeface="+mn-lt"/>
+                <a:ea typeface="+mn-ea"/>
+                <a:cs typeface="+mn-cs"/>
+              </a:rPr>
+              <a:t>attributter</a:t>
+            </a:r>
+            <a:r>
+              <a:rPr lang="en-US" sz="1200" b="0" kern="1200" baseline="0" dirty="0" smtClean="0">
+                <a:solidFill>
+                  <a:schemeClr val="tx1"/>
+                </a:solidFill>
+                <a:latin typeface="+mn-lt"/>
+                <a:ea typeface="+mn-ea"/>
+                <a:cs typeface="+mn-cs"/>
+              </a:rPr>
+              <a:t>)</a:t>
+            </a:r>
             <a:endParaRPr lang="da-DK" dirty="0"/>
           </a:p>
         </p:txBody>
@@ -1321,15 +3273,7 @@
           <a:p>
             <a:r>
               <a:rPr lang="da-DK" baseline="0" dirty="0" smtClean="0"/>
-              <a:t>Oprindeligt – da internettet var et meget lille netværk, fandtes disse oversigter over navne og IP adresser i en Host Lookup </a:t>
-            </a:r>
-            <a:r>
-              <a:rPr lang="da-DK" baseline="0" dirty="0" smtClean="0"/>
-              <a:t>Table </a:t>
-            </a:r>
-            <a:r>
-              <a:rPr lang="da-DK" baseline="0" dirty="0" smtClean="0"/>
-              <a:t>placeret på hver computer på netværket. På denne måde kunne computerne kommunikere vha. logiske navne. Når der tilkom en ny computer på netværket, skulle alle host lookup tables opdateres med det nye navn og den tilhørende IP adresse. Efterhånden som antallet af computere på netværket voksede blev denne procedure umulig. Derfor blev Domain Name System opfundet i 1982. DNS kan sammenlignes med en distribueret telefonbog, som sørger for at mappe logiske navne med IP adresser.</a:t>
+              <a:t>Oprindeligt – da internettet var et meget lille netværk, fandtes disse oversigter over navne og IP adresser i en Host Lookup Table placeret på hver computer på netværket. På denne måde kunne computerne kommunikere vha. logiske navne. Når der tilkom en ny computer på netværket, skulle alle host lookup tables opdateres med det nye navn og den tilhørende IP adresse. Efterhånden som antallet af computere på netværket voksede blev denne procedure umulig. Derfor blev Domain Name System opfundet i 1982. DNS kan sammenlignes med en distribueret telefonbog, som sørger for at mappe logiske navne med IP adresser.</a:t>
             </a:r>
           </a:p>
           <a:p>
@@ -2218,7 +4162,7 @@
             <a:fld id="{F95D7CF2-08BE-4584-88A3-02DBA3238833}" type="datetimeFigureOut">
               <a:rPr lang="da-DK" smtClean="0"/>
               <a:pPr/>
-              <a:t>28-05-2013</a:t>
+              <a:t>28/05/13</a:t>
             </a:fld>
             <a:endParaRPr lang="da-DK"/>
           </a:p>
@@ -2405,7 +4349,7 @@
             <a:fld id="{F95D7CF2-08BE-4584-88A3-02DBA3238833}" type="datetimeFigureOut">
               <a:rPr lang="da-DK" smtClean="0"/>
               <a:pPr/>
-              <a:t>28-05-2013</a:t>
+              <a:t>28/05/13</a:t>
             </a:fld>
             <a:endParaRPr lang="da-DK"/>
           </a:p>
@@ -2592,7 +4536,7 @@
             <a:fld id="{F95D7CF2-08BE-4584-88A3-02DBA3238833}" type="datetimeFigureOut">
               <a:rPr lang="da-DK" smtClean="0"/>
               <a:pPr/>
-              <a:t>28-05-2013</a:t>
+              <a:t>28/05/13</a:t>
             </a:fld>
             <a:endParaRPr lang="da-DK"/>
           </a:p>
@@ -2779,7 +4723,7 @@
             <a:fld id="{F95D7CF2-08BE-4584-88A3-02DBA3238833}" type="datetimeFigureOut">
               <a:rPr lang="da-DK" smtClean="0"/>
               <a:pPr/>
-              <a:t>28-05-2013</a:t>
+              <a:t>28/05/13</a:t>
             </a:fld>
             <a:endParaRPr lang="da-DK"/>
           </a:p>
@@ -3162,7 +5106,7 @@
             <a:fld id="{F95D7CF2-08BE-4584-88A3-02DBA3238833}" type="datetimeFigureOut">
               <a:rPr lang="da-DK" smtClean="0"/>
               <a:pPr/>
-              <a:t>28-05-2013</a:t>
+              <a:t>28/05/13</a:t>
             </a:fld>
             <a:endParaRPr lang="da-DK"/>
           </a:p>
@@ -3433,7 +5377,7 @@
             <a:fld id="{F95D7CF2-08BE-4584-88A3-02DBA3238833}" type="datetimeFigureOut">
               <a:rPr lang="da-DK" smtClean="0"/>
               <a:pPr/>
-              <a:t>28-05-2013</a:t>
+              <a:t>28/05/13</a:t>
             </a:fld>
             <a:endParaRPr lang="da-DK"/>
           </a:p>
@@ -3820,7 +5764,7 @@
             <a:fld id="{F95D7CF2-08BE-4584-88A3-02DBA3238833}" type="datetimeFigureOut">
               <a:rPr lang="da-DK" smtClean="0"/>
               <a:pPr/>
-              <a:t>28-05-2013</a:t>
+              <a:t>28/05/13</a:t>
             </a:fld>
             <a:endParaRPr lang="da-DK"/>
           </a:p>
@@ -3943,7 +5887,7 @@
             <a:fld id="{F95D7CF2-08BE-4584-88A3-02DBA3238833}" type="datetimeFigureOut">
               <a:rPr lang="da-DK" smtClean="0"/>
               <a:pPr/>
-              <a:t>28-05-2013</a:t>
+              <a:t>28/05/13</a:t>
             </a:fld>
             <a:endParaRPr lang="da-DK"/>
           </a:p>
@@ -4125,7 +6069,7 @@
             <a:fld id="{F95D7CF2-08BE-4584-88A3-02DBA3238833}" type="datetimeFigureOut">
               <a:rPr lang="da-DK" smtClean="0"/>
               <a:pPr/>
-              <a:t>28-05-2013</a:t>
+              <a:t>28/05/13</a:t>
             </a:fld>
             <a:endParaRPr lang="da-DK"/>
           </a:p>
@@ -4461,7 +6405,7 @@
             <a:fld id="{F95D7CF2-08BE-4584-88A3-02DBA3238833}" type="datetimeFigureOut">
               <a:rPr lang="da-DK" smtClean="0"/>
               <a:pPr/>
-              <a:t>28-05-2013</a:t>
+              <a:t>28/05/13</a:t>
             </a:fld>
             <a:endParaRPr lang="da-DK"/>
           </a:p>
@@ -4832,7 +6776,7 @@
             <a:fld id="{F95D7CF2-08BE-4584-88A3-02DBA3238833}" type="datetimeFigureOut">
               <a:rPr lang="da-DK" smtClean="0"/>
               <a:pPr/>
-              <a:t>28-05-2013</a:t>
+              <a:t>28/05/13</a:t>
             </a:fld>
             <a:endParaRPr lang="da-DK"/>
           </a:p>
@@ -5252,7 +7196,7 @@
             <a:fld id="{F95D7CF2-08BE-4584-88A3-02DBA3238833}" type="datetimeFigureOut">
               <a:rPr lang="da-DK" smtClean="0"/>
               <a:pPr/>
-              <a:t>28-05-2013</a:t>
+              <a:t>28/05/13</a:t>
             </a:fld>
             <a:endParaRPr lang="da-DK"/>
           </a:p>
@@ -5761,7 +7705,7 @@
   <p:timing>
     <p:tnLst>
       <p:par>
-        <p:cTn id="1" dur="indefinite" restart="never" nodeType="tmRoot"/>
+        <p:cTn xmlns:p14="http://schemas.microsoft.com/office/powerpoint/2010/main" id="1" dur="indefinite" restart="never" nodeType="tmRoot"/>
       </p:par>
     </p:tnLst>
   </p:timing>
@@ -5896,7 +7840,7 @@
   <p:timing>
     <p:tnLst>
       <p:par>
-        <p:cTn id="1" dur="indefinite" restart="never" nodeType="tmRoot"/>
+        <p:cTn xmlns:p14="http://schemas.microsoft.com/office/powerpoint/2010/main" id="1" dur="indefinite" restart="never" nodeType="tmRoot"/>
       </p:par>
     </p:tnLst>
   </p:timing>
@@ -6023,7 +7967,7 @@
   <p:timing>
     <p:tnLst>
       <p:par>
-        <p:cTn id="1" dur="indefinite" restart="never" nodeType="tmRoot"/>
+        <p:cTn xmlns:p14="http://schemas.microsoft.com/office/powerpoint/2010/main" id="1" dur="indefinite" restart="never" nodeType="tmRoot"/>
       </p:par>
     </p:tnLst>
   </p:timing>
@@ -6214,7 +8158,7 @@
   <p:timing>
     <p:tnLst>
       <p:par>
-        <p:cTn id="1" dur="indefinite" restart="never" nodeType="tmRoot"/>
+        <p:cTn xmlns:p14="http://schemas.microsoft.com/office/powerpoint/2010/main" id="1" dur="indefinite" restart="never" nodeType="tmRoot"/>
       </p:par>
     </p:tnLst>
   </p:timing>
@@ -6441,7 +8385,7 @@
   <p:timing>
     <p:tnLst>
       <p:par>
-        <p:cTn id="1" dur="indefinite" restart="never" nodeType="tmRoot"/>
+        <p:cTn xmlns:p14="http://schemas.microsoft.com/office/powerpoint/2010/main" id="1" dur="indefinite" restart="never" nodeType="tmRoot"/>
       </p:par>
     </p:tnLst>
   </p:timing>
@@ -6526,21 +8470,8 @@
             </a:pPr>
             <a:r>
               <a:rPr lang="da-DK" dirty="0" smtClean="0"/>
-              <a:t>Implementering </a:t>
-            </a:r>
-            <a:r>
-              <a:rPr lang="da-DK" dirty="0" smtClean="0"/>
-              <a:t>af </a:t>
-            </a:r>
-            <a:r>
-              <a:rPr lang="da-DK" dirty="0" smtClean="0"/>
-              <a:t>DNS </a:t>
-            </a:r>
-            <a:r>
-              <a:rPr lang="da-DK" dirty="0" smtClean="0"/>
-              <a:t>protokollen</a:t>
-            </a:r>
-            <a:endParaRPr lang="da-DK" dirty="0" smtClean="0"/>
+              <a:t>Implementering af DNS protokollen</a:t>
+            </a:r>
           </a:p>
           <a:p>
             <a:pPr lvl="1">
@@ -6553,13 +8484,8 @@
             </a:pPr>
             <a:r>
               <a:rPr lang="da-DK" dirty="0" smtClean="0"/>
-              <a:t>Den mest udbredte DNS </a:t>
-            </a:r>
-            <a:r>
-              <a:rPr lang="da-DK" dirty="0" smtClean="0"/>
-              <a:t>server software</a:t>
-            </a:r>
-            <a:endParaRPr lang="da-DK" dirty="0" smtClean="0"/>
+              <a:t>Den mest udbredte DNS server software</a:t>
+            </a:r>
           </a:p>
           <a:p>
             <a:pPr lvl="1">
@@ -6606,7 +8532,7 @@
   <p:timing>
     <p:tnLst>
       <p:par>
-        <p:cTn id="1" dur="indefinite" restart="never" nodeType="tmRoot"/>
+        <p:cTn xmlns:p14="http://schemas.microsoft.com/office/powerpoint/2010/main" id="1" dur="indefinite" restart="never" nodeType="tmRoot"/>
       </p:par>
     </p:tnLst>
   </p:timing>
@@ -6750,7 +8676,7 @@
   <p:timing>
     <p:tnLst>
       <p:par>
-        <p:cTn id="1" dur="indefinite" restart="never" nodeType="tmRoot"/>
+        <p:cTn xmlns:p14="http://schemas.microsoft.com/office/powerpoint/2010/main" id="1" dur="indefinite" restart="never" nodeType="tmRoot"/>
       </p:par>
     </p:tnLst>
   </p:timing>
@@ -7019,7 +8945,7 @@
   <p:timing>
     <p:tnLst>
       <p:par>
-        <p:cTn id="1" dur="indefinite" restart="never" nodeType="tmRoot"/>
+        <p:cTn xmlns:p14="http://schemas.microsoft.com/office/powerpoint/2010/main" id="1" dur="indefinite" restart="never" nodeType="tmRoot"/>
       </p:par>
     </p:tnLst>
   </p:timing>
@@ -7204,7 +9130,7 @@
   <p:timing>
     <p:tnLst>
       <p:par>
-        <p:cTn id="1" dur="indefinite" restart="never" nodeType="tmRoot"/>
+        <p:cTn xmlns:p14="http://schemas.microsoft.com/office/powerpoint/2010/main" id="1" dur="indefinite" restart="never" nodeType="tmRoot"/>
       </p:par>
     </p:tnLst>
   </p:timing>
@@ -7293,7 +9219,7 @@
   <p:timing>
     <p:tnLst>
       <p:par>
-        <p:cTn id="1" dur="indefinite" restart="never" nodeType="tmRoot"/>
+        <p:cTn xmlns:p14="http://schemas.microsoft.com/office/powerpoint/2010/main" id="1" dur="indefinite" restart="never" nodeType="tmRoot"/>
       </p:par>
     </p:tnLst>
   </p:timing>
@@ -7375,7 +9301,6 @@
               <a:rPr lang="da-DK" sz="2800" dirty="0" smtClean="0"/>
               <a:t>Naming in distributed systems</a:t>
             </a:r>
-            <a:endParaRPr lang="da-DK" sz="2800" dirty="0" smtClean="0"/>
           </a:p>
           <a:p>
             <a:pPr>
@@ -7475,7 +9400,7 @@
   <p:timing>
     <p:tnLst>
       <p:par>
-        <p:cTn id="1" dur="indefinite" restart="never" nodeType="tmRoot"/>
+        <p:cTn xmlns:p14="http://schemas.microsoft.com/office/powerpoint/2010/main" id="1" dur="indefinite" restart="never" nodeType="tmRoot"/>
       </p:par>
     </p:tnLst>
   </p:timing>
@@ -7702,7 +9627,7 @@
   <p:timing>
     <p:tnLst>
       <p:par>
-        <p:cTn id="1" dur="indefinite" restart="never" nodeType="tmRoot"/>
+        <p:cTn xmlns:p14="http://schemas.microsoft.com/office/powerpoint/2010/main" id="1" dur="indefinite" restart="never" nodeType="tmRoot"/>
       </p:par>
     </p:tnLst>
   </p:timing>
@@ -7787,11 +9712,7 @@
             </a:pPr>
             <a:r>
               <a:rPr lang="da-DK" dirty="0" smtClean="0"/>
-              <a:t>Refererer </a:t>
-            </a:r>
-            <a:r>
-              <a:rPr lang="da-DK" dirty="0" smtClean="0"/>
-              <a:t>til en enhed</a:t>
+              <a:t>Refererer til en enhed</a:t>
             </a:r>
           </a:p>
           <a:p>
@@ -7805,17 +9726,8 @@
             </a:pPr>
             <a:r>
               <a:rPr lang="da-DK" dirty="0" smtClean="0"/>
-              <a:t>Logiske navne </a:t>
-            </a:r>
-            <a:r>
-              <a:rPr lang="da-DK" dirty="0" smtClean="0"/>
-              <a:t>vs. IP </a:t>
-            </a:r>
-            <a:r>
-              <a:rPr lang="da-DK" dirty="0" smtClean="0"/>
-              <a:t>adresser</a:t>
-            </a:r>
-            <a:endParaRPr lang="da-DK" dirty="0" smtClean="0"/>
+              <a:t>Logiske navne vs. IP adresser</a:t>
+            </a:r>
           </a:p>
           <a:p>
             <a:pPr>
@@ -7891,7 +9803,7 @@
   <p:timing>
     <p:tnLst>
       <p:par>
-        <p:cTn id="1" dur="indefinite" restart="never" nodeType="tmRoot"/>
+        <p:cTn xmlns:p14="http://schemas.microsoft.com/office/powerpoint/2010/main" id="1" dur="indefinite" restart="never" nodeType="tmRoot"/>
       </p:par>
     </p:tnLst>
   </p:timing>
@@ -7976,11 +9888,7 @@
             </a:pPr>
             <a:r>
               <a:rPr lang="da-DK" dirty="0" smtClean="0"/>
-              <a:t>Refererer </a:t>
-            </a:r>
-            <a:r>
-              <a:rPr lang="da-DK" dirty="0" smtClean="0"/>
-              <a:t>til en enhed</a:t>
+              <a:t>Refererer til en enhed</a:t>
             </a:r>
           </a:p>
           <a:p>
@@ -7994,11 +9902,7 @@
             </a:pPr>
             <a:r>
               <a:rPr lang="da-DK" dirty="0" smtClean="0"/>
-              <a:t>Logiske navne </a:t>
-            </a:r>
-            <a:r>
-              <a:rPr lang="da-DK" dirty="0" smtClean="0"/>
-              <a:t>vs. IP adresser</a:t>
+              <a:t>Logiske navne vs. IP adresser</a:t>
             </a:r>
           </a:p>
           <a:p>
@@ -8185,7 +10089,7 @@
   <p:timing>
     <p:tnLst>
       <p:par>
-        <p:cTn id="1" dur="indefinite" restart="never" nodeType="tmRoot"/>
+        <p:cTn xmlns:p14="http://schemas.microsoft.com/office/powerpoint/2010/main" id="1" dur="indefinite" restart="never" nodeType="tmRoot"/>
       </p:par>
     </p:tnLst>
   </p:timing>
@@ -8412,7 +10316,7 @@
   <p:timing>
     <p:tnLst>
       <p:par>
-        <p:cTn id="1" dur="indefinite" restart="never" nodeType="tmRoot"/>
+        <p:cTn xmlns:p14="http://schemas.microsoft.com/office/powerpoint/2010/main" id="1" dur="indefinite" restart="never" nodeType="tmRoot"/>
       </p:par>
     </p:tnLst>
   </p:timing>
@@ -8539,7 +10443,6 @@
               <a:rPr lang="da-DK" sz="2000" dirty="0" smtClean="0"/>
               <a:t>1982: DNS</a:t>
             </a:r>
-            <a:endParaRPr lang="da-DK" sz="2000" dirty="0" smtClean="0"/>
           </a:p>
           <a:p>
             <a:pPr lvl="1">
@@ -8549,19 +10452,7 @@
             </a:pPr>
             <a:r>
               <a:rPr lang="da-DK" sz="1800" dirty="0" smtClean="0"/>
-              <a:t>lokal </a:t>
-            </a:r>
-            <a:r>
-              <a:rPr lang="da-DK" sz="1800" dirty="0" smtClean="0"/>
-              <a:t>HTL og </a:t>
-            </a:r>
-            <a:r>
-              <a:rPr lang="da-DK" sz="1800" dirty="0" smtClean="0"/>
-              <a:t>distribueret hierarkisk </a:t>
-            </a:r>
-            <a:r>
-              <a:rPr lang="da-DK" sz="1800" dirty="0" smtClean="0"/>
-              <a:t>database med 13 root servere</a:t>
+              <a:t>lokal HTL og distribueret hierarkisk database med 13 root servere</a:t>
             </a:r>
           </a:p>
           <a:p>
@@ -8652,7 +10543,7 @@
   <p:timing>
     <p:tnLst>
       <p:par>
-        <p:cTn id="1" dur="indefinite" restart="never" nodeType="tmRoot"/>
+        <p:cTn xmlns:p14="http://schemas.microsoft.com/office/powerpoint/2010/main" id="1" dur="indefinite" restart="never" nodeType="tmRoot"/>
       </p:par>
     </p:tnLst>
   </p:timing>
@@ -8895,7 +10786,7 @@
   <p:timing>
     <p:tnLst>
       <p:par>
-        <p:cTn id="1" dur="indefinite" restart="never" nodeType="tmRoot"/>
+        <p:cTn xmlns:p14="http://schemas.microsoft.com/office/powerpoint/2010/main" id="1" dur="indefinite" restart="never" nodeType="tmRoot"/>
       </p:par>
     </p:tnLst>
   </p:timing>
@@ -8992,7 +10883,7 @@
   <p:timing>
     <p:tnLst>
       <p:par>
-        <p:cTn id="1" dur="indefinite" restart="never" nodeType="tmRoot"/>
+        <p:cTn xmlns:p14="http://schemas.microsoft.com/office/powerpoint/2010/main" id="1" dur="indefinite" restart="never" nodeType="tmRoot"/>
       </p:par>
     </p:tnLst>
   </p:timing>

</xml_diff>

<commit_message>
Rasmus' noter er sat ind i pptx
</commit_message>
<xml_diff>
--- a/Afleveringer/Eksamen/Domain Name System.pptx
+++ b/Afleveringer/Eksamen/Domain Name System.pptx
@@ -210,7 +210,7 @@
             <a:fld id="{2F982AAE-B938-4249-BAB5-25214BF85327}" type="datetimeFigureOut">
               <a:rPr lang="da-DK" smtClean="0"/>
               <a:pPr/>
-              <a:t>28/05/13</a:t>
+              <a:t>28-05-2013</a:t>
             </a:fld>
             <a:endParaRPr lang="da-DK"/>
           </a:p>
@@ -381,7 +381,7 @@
     </p:spTree>
     <p:extLst>
       <p:ext uri="{BB962C8B-B14F-4D97-AF65-F5344CB8AC3E}">
-        <p14:creationId xmlns:p14="http://schemas.microsoft.com/office/powerpoint/2010/main" val="1077962519"/>
+        <p14:creationId xmlns:p14="http://schemas.microsoft.com/office/powerpoint/2010/main" xmlns="" val="1077962519"/>
       </p:ext>
     </p:extLst>
   </p:cSld>
@@ -3387,12 +3387,31 @@
           <a:p>
             <a:r>
               <a:rPr lang="da-DK" dirty="0" smtClean="0"/>
-              <a:t>Fully Qualified Domain Name anvendes når enheder skal identificeres og tilgås. Den specificerer en eksakt</a:t>
-            </a:r>
-            <a:r>
-              <a:rPr lang="da-DK" baseline="0" dirty="0" smtClean="0"/>
-              <a:t> lokation i DNS hierarkiet</a:t>
-            </a:r>
+              <a:t>Fully Qualified Domain Name anvendes når enheder skal identificeres og tilgås.</a:t>
+            </a:r>
+          </a:p>
+          <a:p>
+            <a:r>
+              <a:rPr lang="da-DK" dirty="0" smtClean="0"/>
+              <a:t>- Markeres med et '.'</a:t>
+            </a:r>
+          </a:p>
+          <a:p>
+            <a:r>
+              <a:rPr lang="da-DK" dirty="0" smtClean="0"/>
+              <a:t>- Er det der gør, at man kan tilgå en enhed via dets hostname.</a:t>
+            </a:r>
+          </a:p>
+          <a:p>
+            <a:r>
+              <a:rPr lang="da-DK" dirty="0" smtClean="0"/>
+              <a:t>- Flere kan have det samme hostname, men kan ikke tilgåes på samme hostname på samme netværk med flere identiske hostnames.</a:t>
+            </a:r>
+          </a:p>
+          <a:p>
+            <a:endParaRPr lang="da-DK" dirty="0" smtClean="0"/>
+          </a:p>
+          <a:p>
             <a:endParaRPr lang="da-DK" dirty="0"/>
           </a:p>
         </p:txBody>
@@ -3818,6 +3837,36 @@
             <a:r>
               <a:rPr lang="da-DK" dirty="0" smtClean="0"/>
               <a:t>Rasmus</a:t>
+            </a:r>
+          </a:p>
+          <a:p>
+            <a:r>
+              <a:rPr lang="da-DK" dirty="0" smtClean="0"/>
+              <a:t>- Sikkerhed var ikke med i den første version af DNS – der var ikke behov.</a:t>
+            </a:r>
+          </a:p>
+          <a:p>
+            <a:r>
+              <a:rPr lang="da-DK" dirty="0" smtClean="0"/>
+              <a:t>- Et DNS Request kan interruptes og forkert svar sendes til forspørgeren. I Kina bruger man 'wiretap'.</a:t>
+            </a:r>
+          </a:p>
+          <a:p>
+            <a:r>
+              <a:rPr lang="da-DK" dirty="0" smtClean="0"/>
+              <a:t>- Kan omgås ved at bruge Signed Zones, hvilket er zoner med Trust-Anchors. Det vil sige en zone, hvor alt under den er sikkert.</a:t>
+            </a:r>
+          </a:p>
+          <a:p>
+            <a:r>
+              <a:rPr lang="da-DK" dirty="0" smtClean="0"/>
+              <a:t>- En Signed Zone har et public key som generer en signatur for dets DNS request, således at en forespørger ved at et svar kommer fra den bestemte Signed Zone og ikke er interrupted.</a:t>
+            </a:r>
+          </a:p>
+          <a:p>
+            <a:r>
+              <a:rPr lang="da-DK" smtClean="0"/>
+              <a:t>- Kaldes DNS Security Extentions  (DNSSEC)</a:t>
             </a:r>
             <a:endParaRPr lang="da-DK" dirty="0"/>
           </a:p>
@@ -4162,7 +4211,7 @@
             <a:fld id="{F95D7CF2-08BE-4584-88A3-02DBA3238833}" type="datetimeFigureOut">
               <a:rPr lang="da-DK" smtClean="0"/>
               <a:pPr/>
-              <a:t>28/05/13</a:t>
+              <a:t>28-05-2013</a:t>
             </a:fld>
             <a:endParaRPr lang="da-DK"/>
           </a:p>
@@ -4349,7 +4398,7 @@
             <a:fld id="{F95D7CF2-08BE-4584-88A3-02DBA3238833}" type="datetimeFigureOut">
               <a:rPr lang="da-DK" smtClean="0"/>
               <a:pPr/>
-              <a:t>28/05/13</a:t>
+              <a:t>28-05-2013</a:t>
             </a:fld>
             <a:endParaRPr lang="da-DK"/>
           </a:p>
@@ -4536,7 +4585,7 @@
             <a:fld id="{F95D7CF2-08BE-4584-88A3-02DBA3238833}" type="datetimeFigureOut">
               <a:rPr lang="da-DK" smtClean="0"/>
               <a:pPr/>
-              <a:t>28/05/13</a:t>
+              <a:t>28-05-2013</a:t>
             </a:fld>
             <a:endParaRPr lang="da-DK"/>
           </a:p>
@@ -4723,7 +4772,7 @@
             <a:fld id="{F95D7CF2-08BE-4584-88A3-02DBA3238833}" type="datetimeFigureOut">
               <a:rPr lang="da-DK" smtClean="0"/>
               <a:pPr/>
-              <a:t>28/05/13</a:t>
+              <a:t>28-05-2013</a:t>
             </a:fld>
             <a:endParaRPr lang="da-DK"/>
           </a:p>
@@ -5106,7 +5155,7 @@
             <a:fld id="{F95D7CF2-08BE-4584-88A3-02DBA3238833}" type="datetimeFigureOut">
               <a:rPr lang="da-DK" smtClean="0"/>
               <a:pPr/>
-              <a:t>28/05/13</a:t>
+              <a:t>28-05-2013</a:t>
             </a:fld>
             <a:endParaRPr lang="da-DK"/>
           </a:p>
@@ -5377,7 +5426,7 @@
             <a:fld id="{F95D7CF2-08BE-4584-88A3-02DBA3238833}" type="datetimeFigureOut">
               <a:rPr lang="da-DK" smtClean="0"/>
               <a:pPr/>
-              <a:t>28/05/13</a:t>
+              <a:t>28-05-2013</a:t>
             </a:fld>
             <a:endParaRPr lang="da-DK"/>
           </a:p>
@@ -5764,7 +5813,7 @@
             <a:fld id="{F95D7CF2-08BE-4584-88A3-02DBA3238833}" type="datetimeFigureOut">
               <a:rPr lang="da-DK" smtClean="0"/>
               <a:pPr/>
-              <a:t>28/05/13</a:t>
+              <a:t>28-05-2013</a:t>
             </a:fld>
             <a:endParaRPr lang="da-DK"/>
           </a:p>
@@ -5887,7 +5936,7 @@
             <a:fld id="{F95D7CF2-08BE-4584-88A3-02DBA3238833}" type="datetimeFigureOut">
               <a:rPr lang="da-DK" smtClean="0"/>
               <a:pPr/>
-              <a:t>28/05/13</a:t>
+              <a:t>28-05-2013</a:t>
             </a:fld>
             <a:endParaRPr lang="da-DK"/>
           </a:p>
@@ -6069,7 +6118,7 @@
             <a:fld id="{F95D7CF2-08BE-4584-88A3-02DBA3238833}" type="datetimeFigureOut">
               <a:rPr lang="da-DK" smtClean="0"/>
               <a:pPr/>
-              <a:t>28/05/13</a:t>
+              <a:t>28-05-2013</a:t>
             </a:fld>
             <a:endParaRPr lang="da-DK"/>
           </a:p>
@@ -6405,7 +6454,7 @@
             <a:fld id="{F95D7CF2-08BE-4584-88A3-02DBA3238833}" type="datetimeFigureOut">
               <a:rPr lang="da-DK" smtClean="0"/>
               <a:pPr/>
-              <a:t>28/05/13</a:t>
+              <a:t>28-05-2013</a:t>
             </a:fld>
             <a:endParaRPr lang="da-DK"/>
           </a:p>
@@ -6776,7 +6825,7 @@
             <a:fld id="{F95D7CF2-08BE-4584-88A3-02DBA3238833}" type="datetimeFigureOut">
               <a:rPr lang="da-DK" smtClean="0"/>
               <a:pPr/>
-              <a:t>28/05/13</a:t>
+              <a:t>28-05-2013</a:t>
             </a:fld>
             <a:endParaRPr lang="da-DK"/>
           </a:p>
@@ -7196,7 +7245,7 @@
             <a:fld id="{F95D7CF2-08BE-4584-88A3-02DBA3238833}" type="datetimeFigureOut">
               <a:rPr lang="da-DK" smtClean="0"/>
               <a:pPr/>
-              <a:t>28/05/13</a:t>
+              <a:t>28-05-2013</a:t>
             </a:fld>
             <a:endParaRPr lang="da-DK"/>
           </a:p>
@@ -7705,7 +7754,7 @@
   <p:timing>
     <p:tnLst>
       <p:par>
-        <p:cTn xmlns:p14="http://schemas.microsoft.com/office/powerpoint/2010/main" id="1" dur="indefinite" restart="never" nodeType="tmRoot"/>
+        <p:cTn id="1" dur="indefinite" restart="never" nodeType="tmRoot"/>
       </p:par>
     </p:tnLst>
   </p:timing>
@@ -7840,7 +7889,7 @@
   <p:timing>
     <p:tnLst>
       <p:par>
-        <p:cTn xmlns:p14="http://schemas.microsoft.com/office/powerpoint/2010/main" id="1" dur="indefinite" restart="never" nodeType="tmRoot"/>
+        <p:cTn id="1" dur="indefinite" restart="never" nodeType="tmRoot"/>
       </p:par>
     </p:tnLst>
   </p:timing>
@@ -7967,7 +8016,7 @@
   <p:timing>
     <p:tnLst>
       <p:par>
-        <p:cTn xmlns:p14="http://schemas.microsoft.com/office/powerpoint/2010/main" id="1" dur="indefinite" restart="never" nodeType="tmRoot"/>
+        <p:cTn id="1" dur="indefinite" restart="never" nodeType="tmRoot"/>
       </p:par>
     </p:tnLst>
   </p:timing>
@@ -8158,7 +8207,7 @@
   <p:timing>
     <p:tnLst>
       <p:par>
-        <p:cTn xmlns:p14="http://schemas.microsoft.com/office/powerpoint/2010/main" id="1" dur="indefinite" restart="never" nodeType="tmRoot"/>
+        <p:cTn id="1" dur="indefinite" restart="never" nodeType="tmRoot"/>
       </p:par>
     </p:tnLst>
   </p:timing>
@@ -8385,7 +8434,7 @@
   <p:timing>
     <p:tnLst>
       <p:par>
-        <p:cTn xmlns:p14="http://schemas.microsoft.com/office/powerpoint/2010/main" id="1" dur="indefinite" restart="never" nodeType="tmRoot"/>
+        <p:cTn id="1" dur="indefinite" restart="never" nodeType="tmRoot"/>
       </p:par>
     </p:tnLst>
   </p:timing>
@@ -8532,7 +8581,7 @@
   <p:timing>
     <p:tnLst>
       <p:par>
-        <p:cTn xmlns:p14="http://schemas.microsoft.com/office/powerpoint/2010/main" id="1" dur="indefinite" restart="never" nodeType="tmRoot"/>
+        <p:cTn id="1" dur="indefinite" restart="never" nodeType="tmRoot"/>
       </p:par>
     </p:tnLst>
   </p:timing>
@@ -8676,7 +8725,7 @@
   <p:timing>
     <p:tnLst>
       <p:par>
-        <p:cTn xmlns:p14="http://schemas.microsoft.com/office/powerpoint/2010/main" id="1" dur="indefinite" restart="never" nodeType="tmRoot"/>
+        <p:cTn id="1" dur="indefinite" restart="never" nodeType="tmRoot"/>
       </p:par>
     </p:tnLst>
   </p:timing>
@@ -8945,7 +8994,7 @@
   <p:timing>
     <p:tnLst>
       <p:par>
-        <p:cTn xmlns:p14="http://schemas.microsoft.com/office/powerpoint/2010/main" id="1" dur="indefinite" restart="never" nodeType="tmRoot"/>
+        <p:cTn id="1" dur="indefinite" restart="never" nodeType="tmRoot"/>
       </p:par>
     </p:tnLst>
   </p:timing>
@@ -9130,7 +9179,7 @@
   <p:timing>
     <p:tnLst>
       <p:par>
-        <p:cTn xmlns:p14="http://schemas.microsoft.com/office/powerpoint/2010/main" id="1" dur="indefinite" restart="never" nodeType="tmRoot"/>
+        <p:cTn id="1" dur="indefinite" restart="never" nodeType="tmRoot"/>
       </p:par>
     </p:tnLst>
   </p:timing>
@@ -9219,7 +9268,7 @@
   <p:timing>
     <p:tnLst>
       <p:par>
-        <p:cTn xmlns:p14="http://schemas.microsoft.com/office/powerpoint/2010/main" id="1" dur="indefinite" restart="never" nodeType="tmRoot"/>
+        <p:cTn id="1" dur="indefinite" restart="never" nodeType="tmRoot"/>
       </p:par>
     </p:tnLst>
   </p:timing>
@@ -9400,7 +9449,7 @@
   <p:timing>
     <p:tnLst>
       <p:par>
-        <p:cTn xmlns:p14="http://schemas.microsoft.com/office/powerpoint/2010/main" id="1" dur="indefinite" restart="never" nodeType="tmRoot"/>
+        <p:cTn id="1" dur="indefinite" restart="never" nodeType="tmRoot"/>
       </p:par>
     </p:tnLst>
   </p:timing>
@@ -9627,7 +9676,7 @@
   <p:timing>
     <p:tnLst>
       <p:par>
-        <p:cTn xmlns:p14="http://schemas.microsoft.com/office/powerpoint/2010/main" id="1" dur="indefinite" restart="never" nodeType="tmRoot"/>
+        <p:cTn id="1" dur="indefinite" restart="never" nodeType="tmRoot"/>
       </p:par>
     </p:tnLst>
   </p:timing>
@@ -9803,7 +9852,7 @@
   <p:timing>
     <p:tnLst>
       <p:par>
-        <p:cTn xmlns:p14="http://schemas.microsoft.com/office/powerpoint/2010/main" id="1" dur="indefinite" restart="never" nodeType="tmRoot"/>
+        <p:cTn id="1" dur="indefinite" restart="never" nodeType="tmRoot"/>
       </p:par>
     </p:tnLst>
   </p:timing>
@@ -10089,7 +10138,7 @@
   <p:timing>
     <p:tnLst>
       <p:par>
-        <p:cTn xmlns:p14="http://schemas.microsoft.com/office/powerpoint/2010/main" id="1" dur="indefinite" restart="never" nodeType="tmRoot"/>
+        <p:cTn id="1" dur="indefinite" restart="never" nodeType="tmRoot"/>
       </p:par>
     </p:tnLst>
   </p:timing>
@@ -10316,7 +10365,7 @@
   <p:timing>
     <p:tnLst>
       <p:par>
-        <p:cTn xmlns:p14="http://schemas.microsoft.com/office/powerpoint/2010/main" id="1" dur="indefinite" restart="never" nodeType="tmRoot"/>
+        <p:cTn id="1" dur="indefinite" restart="never" nodeType="tmRoot"/>
       </p:par>
     </p:tnLst>
   </p:timing>
@@ -10543,7 +10592,7 @@
   <p:timing>
     <p:tnLst>
       <p:par>
-        <p:cTn xmlns:p14="http://schemas.microsoft.com/office/powerpoint/2010/main" id="1" dur="indefinite" restart="never" nodeType="tmRoot"/>
+        <p:cTn id="1" dur="indefinite" restart="never" nodeType="tmRoot"/>
       </p:par>
     </p:tnLst>
   </p:timing>
@@ -10786,7 +10835,7 @@
   <p:timing>
     <p:tnLst>
       <p:par>
-        <p:cTn xmlns:p14="http://schemas.microsoft.com/office/powerpoint/2010/main" id="1" dur="indefinite" restart="never" nodeType="tmRoot"/>
+        <p:cTn id="1" dur="indefinite" restart="never" nodeType="tmRoot"/>
       </p:par>
     </p:tnLst>
   </p:timing>
@@ -10883,7 +10932,7 @@
   <p:timing>
     <p:tnLst>
       <p:par>
-        <p:cTn xmlns:p14="http://schemas.microsoft.com/office/powerpoint/2010/main" id="1" dur="indefinite" restart="never" nodeType="tmRoot"/>
+        <p:cTn id="1" dur="indefinite" restart="never" nodeType="tmRoot"/>
       </p:par>
     </p:tnLst>
   </p:timing>

</xml_diff>